<commit_message>
Add Project Tooltip and Organize the Charts for better Story
</commit_message>
<xml_diff>
--- a/Addressing HR Workforce Challenges/Addressing HR Workforce Challenges.pptx
+++ b/Addressing HR Workforce Challenges/Addressing HR Workforce Challenges.pptx
@@ -5,7 +5,7 @@
     <p:sldMasterId id="2147483699" r:id="rId1"/>
   </p:sldMasterIdLst>
   <p:notesMasterIdLst>
-    <p:notesMasterId r:id="rId30"/>
+    <p:notesMasterId r:id="rId31"/>
   </p:notesMasterIdLst>
   <p:sldIdLst>
     <p:sldId id="256" r:id="rId2"/>
@@ -20,22 +20,23 @@
     <p:sldId id="265" r:id="rId11"/>
     <p:sldId id="266" r:id="rId12"/>
     <p:sldId id="267" r:id="rId13"/>
-    <p:sldId id="270" r:id="rId14"/>
-    <p:sldId id="271" r:id="rId15"/>
-    <p:sldId id="268" r:id="rId16"/>
-    <p:sldId id="269" r:id="rId17"/>
+    <p:sldId id="272" r:id="rId14"/>
+    <p:sldId id="270" r:id="rId15"/>
+    <p:sldId id="286" r:id="rId16"/>
+    <p:sldId id="271" r:id="rId17"/>
     <p:sldId id="273" r:id="rId18"/>
     <p:sldId id="275" r:id="rId19"/>
     <p:sldId id="276" r:id="rId20"/>
-    <p:sldId id="272" r:id="rId21"/>
-    <p:sldId id="274" r:id="rId22"/>
-    <p:sldId id="277" r:id="rId23"/>
-    <p:sldId id="285" r:id="rId24"/>
-    <p:sldId id="279" r:id="rId25"/>
-    <p:sldId id="280" r:id="rId26"/>
-    <p:sldId id="281" r:id="rId27"/>
-    <p:sldId id="282" r:id="rId28"/>
-    <p:sldId id="283" r:id="rId29"/>
+    <p:sldId id="269" r:id="rId21"/>
+    <p:sldId id="268" r:id="rId22"/>
+    <p:sldId id="274" r:id="rId23"/>
+    <p:sldId id="277" r:id="rId24"/>
+    <p:sldId id="285" r:id="rId25"/>
+    <p:sldId id="279" r:id="rId26"/>
+    <p:sldId id="280" r:id="rId27"/>
+    <p:sldId id="281" r:id="rId28"/>
+    <p:sldId id="282" r:id="rId29"/>
+    <p:sldId id="283" r:id="rId30"/>
   </p:sldIdLst>
   <p:sldSz cx="12192000" cy="6858000"/>
   <p:notesSz cx="6858000" cy="9144000"/>
@@ -134,6 +135,11 @@
       </a:defRPr>
     </a:lvl9pPr>
   </p:defaultTextStyle>
+  <p:extLst>
+    <p:ext uri="{EFAFB233-063F-42B5-8137-9DF3F51BA10A}">
+      <p15:sldGuideLst xmlns:p15="http://schemas.microsoft.com/office/powerpoint/2012/main"/>
+    </p:ext>
+  </p:extLst>
 </p:presentation>
 </file>
 
@@ -3035,7 +3041,7 @@
           <a:p>
             <a:fld id="{B6349C6F-CAF3-4638-9A95-9B4998B049BD}" type="datetimeFigureOut">
               <a:rPr lang="en-US" smtClean="0"/>
-              <a:t>5/31/2025</a:t>
+              <a:t>6/1/2025</a:t>
             </a:fld>
             <a:endParaRPr lang="en-US"/>
           </a:p>
@@ -3367,7 +3373,7 @@
           <a:p>
             <a:fld id="{7BBA234B-0EC5-46A6-8FB5-3EB6EFF6AB21}" type="slidenum">
               <a:rPr lang="en-US" smtClean="0"/>
-              <a:t>25</a:t>
+              <a:t>26</a:t>
             </a:fld>
             <a:endParaRPr lang="en-US"/>
           </a:p>
@@ -3577,7 +3583,7 @@
           <a:p>
             <a:fld id="{E80C50CD-E178-4744-9B35-B2F624D6C5E9}" type="datetimeFigureOut">
               <a:rPr lang="en-US" smtClean="0"/>
-              <a:t>5/31/2025</a:t>
+              <a:t>6/1/2025</a:t>
             </a:fld>
             <a:endParaRPr lang="en-US"/>
           </a:p>
@@ -4014,7 +4020,7 @@
             <a:fld id="{E80C50CD-E178-4744-9B35-B2F624D6C5E9}" type="datetimeFigureOut">
               <a:rPr lang="en-US" smtClean="0"/>
               <a:pPr/>
-              <a:t>5/31/2025</a:t>
+              <a:t>6/1/2025</a:t>
             </a:fld>
             <a:endParaRPr lang="en-US"/>
           </a:p>
@@ -4266,7 +4272,7 @@
             <a:fld id="{E80C50CD-E178-4744-9B35-B2F624D6C5E9}" type="datetimeFigureOut">
               <a:rPr lang="en-US" smtClean="0"/>
               <a:pPr/>
-              <a:t>5/31/2025</a:t>
+              <a:t>6/1/2025</a:t>
             </a:fld>
             <a:endParaRPr lang="en-US"/>
           </a:p>
@@ -4576,7 +4582,7 @@
             <a:fld id="{E80C50CD-E178-4744-9B35-B2F624D6C5E9}" type="datetimeFigureOut">
               <a:rPr lang="en-US" smtClean="0"/>
               <a:pPr/>
-              <a:t>5/31/2025</a:t>
+              <a:t>6/1/2025</a:t>
             </a:fld>
             <a:endParaRPr lang="en-US"/>
           </a:p>
@@ -4896,7 +4902,7 @@
             <a:fld id="{E80C50CD-E178-4744-9B35-B2F624D6C5E9}" type="datetimeFigureOut">
               <a:rPr lang="en-US" smtClean="0"/>
               <a:pPr/>
-              <a:t>5/31/2025</a:t>
+              <a:t>6/1/2025</a:t>
             </a:fld>
             <a:endParaRPr lang="en-US"/>
           </a:p>
@@ -5200,7 +5206,7 @@
             <a:fld id="{E80C50CD-E178-4744-9B35-B2F624D6C5E9}" type="datetimeFigureOut">
               <a:rPr lang="en-US" smtClean="0"/>
               <a:pPr/>
-              <a:t>5/31/2025</a:t>
+              <a:t>6/1/2025</a:t>
             </a:fld>
             <a:endParaRPr lang="en-US"/>
           </a:p>
@@ -5569,7 +5575,7 @@
             <a:fld id="{E80C50CD-E178-4744-9B35-B2F624D6C5E9}" type="datetimeFigureOut">
               <a:rPr lang="en-US" smtClean="0"/>
               <a:pPr/>
-              <a:t>5/31/2025</a:t>
+              <a:t>6/1/2025</a:t>
             </a:fld>
             <a:endParaRPr lang="en-US"/>
           </a:p>
@@ -5744,7 +5750,7 @@
           <a:p>
             <a:fld id="{E80C50CD-E178-4744-9B35-B2F624D6C5E9}" type="datetimeFigureOut">
               <a:rPr lang="en-US" smtClean="0"/>
-              <a:t>5/31/2025</a:t>
+              <a:t>6/1/2025</a:t>
             </a:fld>
             <a:endParaRPr lang="en-US"/>
           </a:p>
@@ -5924,7 +5930,7 @@
           <a:p>
             <a:fld id="{E80C50CD-E178-4744-9B35-B2F624D6C5E9}" type="datetimeFigureOut">
               <a:rPr lang="en-US" smtClean="0"/>
-              <a:t>5/31/2025</a:t>
+              <a:t>6/1/2025</a:t>
             </a:fld>
             <a:endParaRPr lang="en-US"/>
           </a:p>
@@ -6094,7 +6100,7 @@
           <a:p>
             <a:fld id="{E80C50CD-E178-4744-9B35-B2F624D6C5E9}" type="datetimeFigureOut">
               <a:rPr lang="en-US" smtClean="0"/>
-              <a:t>5/31/2025</a:t>
+              <a:t>6/1/2025</a:t>
             </a:fld>
             <a:endParaRPr lang="en-US"/>
           </a:p>
@@ -6344,7 +6350,7 @@
           <a:p>
             <a:fld id="{E80C50CD-E178-4744-9B35-B2F624D6C5E9}" type="datetimeFigureOut">
               <a:rPr lang="en-US" smtClean="0"/>
-              <a:t>5/31/2025</a:t>
+              <a:t>6/1/2025</a:t>
             </a:fld>
             <a:endParaRPr lang="en-US"/>
           </a:p>
@@ -6580,7 +6586,7 @@
           <a:p>
             <a:fld id="{E80C50CD-E178-4744-9B35-B2F624D6C5E9}" type="datetimeFigureOut">
               <a:rPr lang="en-US" smtClean="0"/>
-              <a:t>5/31/2025</a:t>
+              <a:t>6/1/2025</a:t>
             </a:fld>
             <a:endParaRPr lang="en-US"/>
           </a:p>
@@ -6962,7 +6968,7 @@
           <a:p>
             <a:fld id="{E80C50CD-E178-4744-9B35-B2F624D6C5E9}" type="datetimeFigureOut">
               <a:rPr lang="en-US" smtClean="0"/>
-              <a:t>5/31/2025</a:t>
+              <a:t>6/1/2025</a:t>
             </a:fld>
             <a:endParaRPr lang="en-US"/>
           </a:p>
@@ -7080,7 +7086,7 @@
           <a:p>
             <a:fld id="{E80C50CD-E178-4744-9B35-B2F624D6C5E9}" type="datetimeFigureOut">
               <a:rPr lang="en-US" smtClean="0"/>
-              <a:t>5/31/2025</a:t>
+              <a:t>6/1/2025</a:t>
             </a:fld>
             <a:endParaRPr lang="en-US"/>
           </a:p>
@@ -7175,7 +7181,7 @@
           <a:p>
             <a:fld id="{E80C50CD-E178-4744-9B35-B2F624D6C5E9}" type="datetimeFigureOut">
               <a:rPr lang="en-US" smtClean="0"/>
-              <a:t>5/31/2025</a:t>
+              <a:t>6/1/2025</a:t>
             </a:fld>
             <a:endParaRPr lang="en-US"/>
           </a:p>
@@ -7430,7 +7436,7 @@
           <a:p>
             <a:fld id="{E80C50CD-E178-4744-9B35-B2F624D6C5E9}" type="datetimeFigureOut">
               <a:rPr lang="en-US" smtClean="0"/>
-              <a:t>5/31/2025</a:t>
+              <a:t>6/1/2025</a:t>
             </a:fld>
             <a:endParaRPr lang="en-US"/>
           </a:p>
@@ -7713,7 +7719,7 @@
           <a:p>
             <a:fld id="{E80C50CD-E178-4744-9B35-B2F624D6C5E9}" type="datetimeFigureOut">
               <a:rPr lang="en-US" smtClean="0"/>
-              <a:t>5/31/2025</a:t>
+              <a:t>6/1/2025</a:t>
             </a:fld>
             <a:endParaRPr lang="en-US"/>
           </a:p>
@@ -8120,7 +8126,7 @@
             <a:fld id="{E80C50CD-E178-4744-9B35-B2F624D6C5E9}" type="datetimeFigureOut">
               <a:rPr lang="en-US" smtClean="0"/>
               <a:pPr/>
-              <a:t>5/31/2025</a:t>
+              <a:t>6/1/2025</a:t>
             </a:fld>
             <a:endParaRPr lang="en-US"/>
           </a:p>
@@ -8683,10 +8689,10 @@
       </p:grpSpPr>
       <p:sp useBgFill="1">
         <p:nvSpPr>
-          <p:cNvPr id="21" name="Rectangle 20">
+          <p:cNvPr id="27" name="Rectangle 26">
             <a:extLst>
               <a:ext uri="{FF2B5EF4-FFF2-40B4-BE49-F238E27FC236}">
-                <a16:creationId xmlns:a16="http://schemas.microsoft.com/office/drawing/2014/main" id="{1511F85B-5967-428B-BE8B-819A79813D92}"/>
+                <a16:creationId xmlns:a16="http://schemas.microsoft.com/office/drawing/2014/main" id="{E72AA1E7-7434-43A0-9D05-3C7D3ACC0539}"/>
               </a:ext>
               <a:ext uri="{C183D7F6-B498-43B3-948B-1728B52AA6E4}">
                 <adec:decorative xmlns:adec="http://schemas.microsoft.com/office/drawing/2017/decorative" val="1"/>
@@ -8706,7 +8712,7 @@
         </p:nvSpPr>
         <p:spPr>
           <a:xfrm>
-            <a:off x="0" y="-2"/>
+            <a:off x="0" y="0"/>
             <a:ext cx="12192000" cy="6858000"/>
           </a:xfrm>
           <a:prstGeom prst="rect">
@@ -8741,6 +8747,55 @@
           </a:p>
         </p:txBody>
       </p:sp>
+      <p:sp>
+        <p:nvSpPr>
+          <p:cNvPr id="4" name="TextBox 3">
+            <a:extLst>
+              <a:ext uri="{FF2B5EF4-FFF2-40B4-BE49-F238E27FC236}">
+                <a16:creationId xmlns:a16="http://schemas.microsoft.com/office/drawing/2014/main" id="{83D0C7B9-D944-3CCF-775D-8D99A1391134}"/>
+              </a:ext>
+            </a:extLst>
+          </p:cNvPr>
+          <p:cNvSpPr txBox="1"/>
+          <p:nvPr/>
+        </p:nvSpPr>
+        <p:spPr>
+          <a:xfrm>
+            <a:off x="684213" y="685799"/>
+            <a:ext cx="6460510" cy="2971801"/>
+          </a:xfrm>
+          <a:prstGeom prst="rect">
+            <a:avLst/>
+          </a:prstGeom>
+        </p:spPr>
+        <p:txBody>
+          <a:bodyPr vert="horz" lIns="91440" tIns="45720" rIns="91440" bIns="45720" rtlCol="0" anchor="b">
+            <a:normAutofit/>
+          </a:bodyPr>
+          <a:lstStyle/>
+          <a:p>
+            <a:pPr>
+              <a:spcBef>
+                <a:spcPct val="0"/>
+              </a:spcBef>
+              <a:spcAft>
+                <a:spcPts val="600"/>
+              </a:spcAft>
+            </a:pPr>
+            <a:r>
+              <a:rPr lang="en-US" sz="4800" b="1" cap="all">
+                <a:ln w="3175" cmpd="sng">
+                  <a:noFill/>
+                </a:ln>
+                <a:latin typeface="+mj-lt"/>
+                <a:ea typeface="+mj-ea"/>
+                <a:cs typeface="+mj-cs"/>
+              </a:rPr>
+              <a:t>Addressing HR Workforce Challenges</a:t>
+            </a:r>
+          </a:p>
+        </p:txBody>
+      </p:sp>
       <p:pic>
         <p:nvPicPr>
           <p:cNvPr id="6" name="Picture 5">
@@ -8756,18 +8811,16 @@
           <p:nvPr/>
         </p:nvPicPr>
         <p:blipFill>
-          <a:blip r:embed="rId2">
-            <a:grayscl/>
-          </a:blip>
-          <a:srcRect t="12877" b="12123"/>
+          <a:blip r:embed="rId2"/>
+          <a:srcRect l="49259"/>
           <a:stretch>
             <a:fillRect/>
           </a:stretch>
         </p:blipFill>
         <p:spPr>
           <a:xfrm>
-            <a:off x="20" y="10"/>
-            <a:ext cx="12191980" cy="6857990"/>
+            <a:off x="7552266" y="10"/>
+            <a:ext cx="4639733" cy="6857990"/>
           </a:xfrm>
           <a:prstGeom prst="rect">
             <a:avLst/>
@@ -8778,150 +8831,21 @@
               <a:lumOff val="25000"/>
             </a:schemeClr>
           </a:solidFill>
+          <a:effectLst>
+            <a:innerShdw blurRad="57150" dist="38100" dir="14460000">
+              <a:prstClr val="black">
+                <a:alpha val="70000"/>
+              </a:prstClr>
+            </a:innerShdw>
+          </a:effectLst>
         </p:spPr>
       </p:pic>
-      <p:sp>
-        <p:nvSpPr>
-          <p:cNvPr id="22" name="Snip Diagonal Corner Rectangle 6">
+      <p:grpSp>
+        <p:nvGrpSpPr>
+          <p:cNvPr id="29" name="Group 28">
             <a:extLst>
               <a:ext uri="{FF2B5EF4-FFF2-40B4-BE49-F238E27FC236}">
-                <a16:creationId xmlns:a16="http://schemas.microsoft.com/office/drawing/2014/main" id="{28DA8D05-CF65-4382-8BF4-2A08754DB5F0}"/>
-              </a:ext>
-              <a:ext uri="{C183D7F6-B498-43B3-948B-1728B52AA6E4}">
-                <adec:decorative xmlns:adec="http://schemas.microsoft.com/office/drawing/2017/decorative" val="1"/>
-              </a:ext>
-            </a:extLst>
-          </p:cNvPr>
-          <p:cNvSpPr>
-            <a:spLocks noGrp="1" noRot="1" noChangeAspect="1" noMove="1" noResize="1" noEditPoints="1" noAdjustHandles="1" noChangeArrowheads="1" noChangeShapeType="1" noTextEdit="1"/>
-          </p:cNvSpPr>
-          <p:nvPr>
-            <p:extLst>
-              <p:ext uri="{386F3935-93C4-4BCD-93E2-E3B085C9AB24}">
-                <p16:designElem xmlns:p16="http://schemas.microsoft.com/office/powerpoint/2015/main" val="1"/>
-              </p:ext>
-            </p:extLst>
-          </p:nvPr>
-        </p:nvSpPr>
-        <p:spPr>
-          <a:xfrm flipH="1">
-            <a:off x="0" y="0"/>
-            <a:ext cx="12191075" cy="6857998"/>
-          </a:xfrm>
-          <a:prstGeom prst="snip2DiagRect">
-            <a:avLst>
-              <a:gd name="adj1" fmla="val 0"/>
-              <a:gd name="adj2" fmla="val 42414"/>
-            </a:avLst>
-          </a:prstGeom>
-          <a:gradFill>
-            <a:gsLst>
-              <a:gs pos="2000">
-                <a:schemeClr val="dk2">
-                  <a:tint val="97000"/>
-                  <a:hueMod val="92000"/>
-                  <a:satMod val="169000"/>
-                  <a:lumMod val="164000"/>
-                  <a:alpha val="79000"/>
-                </a:schemeClr>
-              </a:gs>
-              <a:gs pos="100000">
-                <a:schemeClr val="dk2">
-                  <a:shade val="96000"/>
-                  <a:satMod val="120000"/>
-                  <a:lumMod val="90000"/>
-                  <a:alpha val="88000"/>
-                </a:schemeClr>
-              </a:gs>
-            </a:gsLst>
-          </a:gradFill>
-          <a:ln>
-            <a:noFill/>
-          </a:ln>
-          <a:effectLst/>
-        </p:spPr>
-        <p:style>
-          <a:lnRef idx="2">
-            <a:schemeClr val="accent1">
-              <a:shade val="50000"/>
-            </a:schemeClr>
-          </a:lnRef>
-          <a:fillRef idx="1003">
-            <a:schemeClr val="dk2"/>
-          </a:fillRef>
-          <a:effectRef idx="0">
-            <a:schemeClr val="accent1"/>
-          </a:effectRef>
-          <a:fontRef idx="minor">
-            <a:schemeClr val="lt1"/>
-          </a:fontRef>
-        </p:style>
-        <p:txBody>
-          <a:bodyPr wrap="square" rtlCol="0" anchor="ctr">
-            <a:noAutofit/>
-          </a:bodyPr>
-          <a:lstStyle/>
-          <a:p>
-            <a:pPr algn="ctr"/>
-            <a:endParaRPr lang="en-US"/>
-          </a:p>
-        </p:txBody>
-      </p:sp>
-      <p:sp>
-        <p:nvSpPr>
-          <p:cNvPr id="4" name="TextBox 3">
-            <a:extLst>
-              <a:ext uri="{FF2B5EF4-FFF2-40B4-BE49-F238E27FC236}">
-                <a16:creationId xmlns:a16="http://schemas.microsoft.com/office/drawing/2014/main" id="{83D0C7B9-D944-3CCF-775D-8D99A1391134}"/>
-              </a:ext>
-            </a:extLst>
-          </p:cNvPr>
-          <p:cNvSpPr txBox="1"/>
-          <p:nvPr/>
-        </p:nvSpPr>
-        <p:spPr>
-          <a:xfrm>
-            <a:off x="571274" y="2509284"/>
-            <a:ext cx="6767736" cy="2486049"/>
-          </a:xfrm>
-          <a:prstGeom prst="rect">
-            <a:avLst/>
-          </a:prstGeom>
-        </p:spPr>
-        <p:txBody>
-          <a:bodyPr vert="horz" lIns="91440" tIns="45720" rIns="91440" bIns="45720" rtlCol="0" anchor="b">
-            <a:normAutofit/>
-          </a:bodyPr>
-          <a:lstStyle/>
-          <a:p>
-            <a:pPr>
-              <a:spcBef>
-                <a:spcPct val="0"/>
-              </a:spcBef>
-              <a:spcAft>
-                <a:spcPts val="600"/>
-              </a:spcAft>
-            </a:pPr>
-            <a:r>
-              <a:rPr lang="en-US" sz="4800" b="1" cap="all">
-                <a:ln w="3175" cmpd="sng">
-                  <a:noFill/>
-                </a:ln>
-                <a:latin typeface="+mj-lt"/>
-                <a:ea typeface="+mj-ea"/>
-                <a:cs typeface="+mj-cs"/>
-              </a:rPr>
-              <a:t>Addressing HR Workforce Challenges</a:t>
-            </a:r>
-          </a:p>
-        </p:txBody>
-      </p:sp>
-      <p:grpSp>
-        <p:nvGrpSpPr>
-          <p:cNvPr id="15" name="Group 14">
-            <a:extLst>
-              <a:ext uri="{FF2B5EF4-FFF2-40B4-BE49-F238E27FC236}">
-                <a16:creationId xmlns:a16="http://schemas.microsoft.com/office/drawing/2014/main" id="{E0C6252F-9468-4CFE-8A28-0DFE703FB7BC}"/>
+                <a16:creationId xmlns:a16="http://schemas.microsoft.com/office/drawing/2014/main" id="{466FBB0E-B024-4E3B-9BBD-FF15FC76B681}"/>
               </a:ext>
               <a:ext uri="{C183D7F6-B498-43B3-948B-1728B52AA6E4}">
                 <adec:decorative xmlns:adec="http://schemas.microsoft.com/office/drawing/2017/decorative" val="1"/>
@@ -8941,7 +8865,7 @@
         </p:nvGrpSpPr>
         <p:grpSpPr>
           <a:xfrm>
-            <a:off x="6111344" y="9144"/>
+            <a:off x="6108170" y="8467"/>
             <a:ext cx="6080656" cy="6163733"/>
             <a:chOff x="6108170" y="8467"/>
             <a:chExt cx="6080656" cy="6163733"/>
@@ -8949,10 +8873,10 @@
         </p:grpSpPr>
         <p:cxnSp>
           <p:nvCxnSpPr>
-            <p:cNvPr id="16" name="Straight Connector 15">
+            <p:cNvPr id="30" name="Straight Connector 29">
               <a:extLst>
                 <a:ext uri="{FF2B5EF4-FFF2-40B4-BE49-F238E27FC236}">
-                  <a16:creationId xmlns:a16="http://schemas.microsoft.com/office/drawing/2014/main" id="{F873F8F7-6FEE-4BB3-94A3-78B5C2FF1D8E}"/>
+                  <a16:creationId xmlns:a16="http://schemas.microsoft.com/office/drawing/2014/main" id="{55FA0039-AB97-4DC9-AF4A-AB64CB39F0B8}"/>
                 </a:ext>
                 <a:ext uri="{C183D7F6-B498-43B3-948B-1728B52AA6E4}">
                   <adec:decorative xmlns:adec="http://schemas.microsoft.com/office/drawing/2017/decorative" val="1"/>
@@ -8978,7 +8902,9 @@
             </a:prstGeom>
             <a:ln w="12700">
               <a:solidFill>
-                <a:schemeClr val="tx1"/>
+                <a:srgbClr val="FFFFFF">
+                  <a:alpha val="81176"/>
+                </a:srgbClr>
               </a:solidFill>
             </a:ln>
           </p:spPr>
@@ -8999,10 +8925,10 @@
         </p:cxnSp>
         <p:cxnSp>
           <p:nvCxnSpPr>
-            <p:cNvPr id="17" name="Straight Connector 16">
+            <p:cNvPr id="40" name="Straight Connector 39">
               <a:extLst>
                 <a:ext uri="{FF2B5EF4-FFF2-40B4-BE49-F238E27FC236}">
-                  <a16:creationId xmlns:a16="http://schemas.microsoft.com/office/drawing/2014/main" id="{FF5B2264-1E71-4A5B-ABFC-2832FD78EC99}"/>
+                  <a16:creationId xmlns:a16="http://schemas.microsoft.com/office/drawing/2014/main" id="{A1E5249B-CC4D-4AE0-A6CD-03FE6A9EEC46}"/>
                 </a:ext>
                 <a:ext uri="{C183D7F6-B498-43B3-948B-1728B52AA6E4}">
                   <adec:decorative xmlns:adec="http://schemas.microsoft.com/office/drawing/2017/decorative" val="1"/>
@@ -9028,7 +8954,9 @@
             </a:prstGeom>
             <a:ln w="12700">
               <a:solidFill>
-                <a:schemeClr val="tx1"/>
+                <a:srgbClr val="FFFFFF">
+                  <a:alpha val="81176"/>
+                </a:srgbClr>
               </a:solidFill>
             </a:ln>
           </p:spPr>
@@ -9049,10 +8977,10 @@
         </p:cxnSp>
         <p:cxnSp>
           <p:nvCxnSpPr>
-            <p:cNvPr id="18" name="Straight Connector 17">
+            <p:cNvPr id="32" name="Straight Connector 31">
               <a:extLst>
                 <a:ext uri="{FF2B5EF4-FFF2-40B4-BE49-F238E27FC236}">
-                  <a16:creationId xmlns:a16="http://schemas.microsoft.com/office/drawing/2014/main" id="{C6E0A76D-9460-46B8-BD58-9E9BF9CEB3FE}"/>
+                  <a16:creationId xmlns:a16="http://schemas.microsoft.com/office/drawing/2014/main" id="{7CD40048-2612-4C61-8A89-7A71FE462BFD}"/>
                 </a:ext>
                 <a:ext uri="{C183D7F6-B498-43B3-948B-1728B52AA6E4}">
                   <adec:decorative xmlns:adec="http://schemas.microsoft.com/office/drawing/2017/decorative" val="1"/>
@@ -9078,7 +9006,9 @@
             </a:prstGeom>
             <a:ln w="12700">
               <a:solidFill>
-                <a:schemeClr val="tx1"/>
+                <a:srgbClr val="FFFFFF">
+                  <a:alpha val="81176"/>
+                </a:srgbClr>
               </a:solidFill>
             </a:ln>
           </p:spPr>
@@ -9099,10 +9029,10 @@
         </p:cxnSp>
         <p:cxnSp>
           <p:nvCxnSpPr>
-            <p:cNvPr id="19" name="Straight Connector 18">
+            <p:cNvPr id="33" name="Straight Connector 32">
               <a:extLst>
                 <a:ext uri="{FF2B5EF4-FFF2-40B4-BE49-F238E27FC236}">
-                  <a16:creationId xmlns:a16="http://schemas.microsoft.com/office/drawing/2014/main" id="{47E3790F-67C5-42CD-B933-75C6F3250AA5}"/>
+                  <a16:creationId xmlns:a16="http://schemas.microsoft.com/office/drawing/2014/main" id="{8BD33E3D-C961-4FE1-8880-F55180E2A59A}"/>
                 </a:ext>
                 <a:ext uri="{C183D7F6-B498-43B3-948B-1728B52AA6E4}">
                   <adec:decorative xmlns:adec="http://schemas.microsoft.com/office/drawing/2017/decorative" val="1"/>
@@ -9128,7 +9058,9 @@
             </a:prstGeom>
             <a:ln w="31750">
               <a:solidFill>
-                <a:schemeClr val="tx1"/>
+                <a:srgbClr val="FFFFFF">
+                  <a:alpha val="81176"/>
+                </a:srgbClr>
               </a:solidFill>
             </a:ln>
           </p:spPr>
@@ -9149,10 +9081,10 @@
         </p:cxnSp>
         <p:cxnSp>
           <p:nvCxnSpPr>
-            <p:cNvPr id="20" name="Straight Connector 19">
+            <p:cNvPr id="34" name="Straight Connector 33">
               <a:extLst>
                 <a:ext uri="{FF2B5EF4-FFF2-40B4-BE49-F238E27FC236}">
-                  <a16:creationId xmlns:a16="http://schemas.microsoft.com/office/drawing/2014/main" id="{4EF3C2C4-F6BB-4D14-8577-3649162D0771}"/>
+                  <a16:creationId xmlns:a16="http://schemas.microsoft.com/office/drawing/2014/main" id="{D2266163-3A62-4B10-A0CF-FA0701FC8AE4}"/>
                 </a:ext>
                 <a:ext uri="{C183D7F6-B498-43B3-948B-1728B52AA6E4}">
                   <adec:decorative xmlns:adec="http://schemas.microsoft.com/office/drawing/2017/decorative" val="1"/>
@@ -9178,7 +9110,9 @@
             </a:prstGeom>
             <a:ln w="31750">
               <a:solidFill>
-                <a:schemeClr val="tx1"/>
+                <a:srgbClr val="FFFFFF">
+                  <a:alpha val="81176"/>
+                </a:srgbClr>
               </a:solidFill>
             </a:ln>
           </p:spPr>
@@ -9255,10 +9189,10 @@
       </p:grpSpPr>
       <p:pic>
         <p:nvPicPr>
-          <p:cNvPr id="3" name="Picture 2" descr="A screenshot of a computer&#10;&#10;AI-generated content may be incorrect.">
+          <p:cNvPr id="4" name="Picture 3">
             <a:extLst>
               <a:ext uri="{FF2B5EF4-FFF2-40B4-BE49-F238E27FC236}">
-                <a16:creationId xmlns:a16="http://schemas.microsoft.com/office/drawing/2014/main" id="{335D2FFA-A548-41C1-A53F-CA68ABB7B1A6}"/>
+                <a16:creationId xmlns:a16="http://schemas.microsoft.com/office/drawing/2014/main" id="{17365B94-9F97-DF0A-06E2-BAC871EAF956}"/>
               </a:ext>
             </a:extLst>
           </p:cNvPr>
@@ -9268,13 +9202,7 @@
           <p:nvPr/>
         </p:nvPicPr>
         <p:blipFill>
-          <a:blip r:embed="rId2">
-            <a:extLst>
-              <a:ext uri="{28A0092B-C50C-407E-A947-70E740481C1C}">
-                <a14:useLocalDpi xmlns:a14="http://schemas.microsoft.com/office/drawing/2010/main" val="0"/>
-              </a:ext>
-            </a:extLst>
-          </a:blip>
+          <a:blip r:embed="rId2"/>
           <a:srcRect/>
           <a:stretch>
             <a:fillRect/>
@@ -9300,13 +9228,13 @@
   <p:clrMapOvr>
     <a:masterClrMapping/>
   </p:clrMapOvr>
-  <mc:AlternateContent xmlns:mc="http://schemas.openxmlformats.org/markup-compatibility/2006">
-    <mc:Choice xmlns:p159="http://schemas.microsoft.com/office/powerpoint/2015/09/main" Requires="p159">
+  <mc:AlternateContent xmlns:mc="http://schemas.openxmlformats.org/markup-compatibility/2006" xmlns:p159="http://schemas.microsoft.com/office/powerpoint/2015/09/main">
+    <mc:Choice Requires="p159">
       <p:transition xmlns:p14="http://schemas.microsoft.com/office/powerpoint/2010/main" spd="slow" p14:dur="2000">
         <p159:morph option="byObject"/>
       </p:transition>
     </mc:Choice>
-    <mc:Fallback>
+    <mc:Fallback xmlns="">
       <p:transition spd="slow">
         <p:fade/>
       </p:transition>
@@ -9554,13 +9482,13 @@
   <p:clrMapOvr>
     <a:masterClrMapping/>
   </p:clrMapOvr>
-  <mc:AlternateContent xmlns:mc="http://schemas.openxmlformats.org/markup-compatibility/2006">
-    <mc:Choice xmlns:p159="http://schemas.microsoft.com/office/powerpoint/2015/09/main" Requires="p159">
+  <mc:AlternateContent xmlns:mc="http://schemas.openxmlformats.org/markup-compatibility/2006" xmlns:p159="http://schemas.microsoft.com/office/powerpoint/2015/09/main">
+    <mc:Choice Requires="p159">
       <p:transition xmlns:p14="http://schemas.microsoft.com/office/powerpoint/2010/main" spd="slow" p14:dur="2000">
         <p159:morph option="byObject"/>
       </p:transition>
     </mc:Choice>
-    <mc:Fallback>
+    <mc:Fallback xmlns="">
       <p:transition spd="slow">
         <p:fade/>
       </p:transition>
@@ -9851,6 +9779,310 @@
         <p:cNvPr id="1" name="">
           <a:extLst>
             <a:ext uri="{FF2B5EF4-FFF2-40B4-BE49-F238E27FC236}">
+              <a16:creationId xmlns:a16="http://schemas.microsoft.com/office/drawing/2014/main" id="{86B378FC-ADE7-A1FC-D9A5-04E5E8A36FA9}"/>
+            </a:ext>
+          </a:extLst>
+        </p:cNvPr>
+        <p:cNvGrpSpPr/>
+        <p:nvPr/>
+      </p:nvGrpSpPr>
+      <p:grpSpPr>
+        <a:xfrm>
+          <a:off x="0" y="0"/>
+          <a:ext cx="0" cy="0"/>
+          <a:chOff x="0" y="0"/>
+          <a:chExt cx="0" cy="0"/>
+        </a:xfrm>
+      </p:grpSpPr>
+      <p:sp>
+        <p:nvSpPr>
+          <p:cNvPr id="6" name="TextBox 5">
+            <a:extLst>
+              <a:ext uri="{FF2B5EF4-FFF2-40B4-BE49-F238E27FC236}">
+                <a16:creationId xmlns:a16="http://schemas.microsoft.com/office/drawing/2014/main" id="{A0CFCC0A-4C39-44E5-9223-FF03BE566F33}"/>
+              </a:ext>
+            </a:extLst>
+          </p:cNvPr>
+          <p:cNvSpPr txBox="1"/>
+          <p:nvPr/>
+        </p:nvSpPr>
+        <p:spPr>
+          <a:xfrm>
+            <a:off x="404145" y="2136944"/>
+            <a:ext cx="4446987" cy="1815882"/>
+          </a:xfrm>
+          <a:prstGeom prst="rect">
+            <a:avLst/>
+          </a:prstGeom>
+          <a:noFill/>
+        </p:spPr>
+        <p:txBody>
+          <a:bodyPr wrap="square" rtlCol="0">
+            <a:spAutoFit/>
+          </a:bodyPr>
+          <a:lstStyle/>
+          <a:p>
+            <a:pPr marL="285750" indent="-285750">
+              <a:buFont typeface="Arial" panose="020B0604020202020204" pitchFamily="34" charset="0"/>
+              <a:buChar char="•"/>
+            </a:pPr>
+            <a:r>
+              <a:rPr lang="en-US" sz="1400" dirty="0">
+                <a:latin typeface="Open Sans" pitchFamily="2" charset="0"/>
+                <a:ea typeface="Open Sans" pitchFamily="2" charset="0"/>
+                <a:cs typeface="Open Sans" pitchFamily="2" charset="0"/>
+              </a:rPr>
+              <a:t>Projects in </a:t>
+            </a:r>
+            <a:r>
+              <a:rPr lang="en-US" sz="1400" b="1" dirty="0">
+                <a:latin typeface="Open Sans" pitchFamily="2" charset="0"/>
+                <a:ea typeface="Open Sans" pitchFamily="2" charset="0"/>
+                <a:cs typeface="Open Sans" pitchFamily="2" charset="0"/>
+              </a:rPr>
+              <a:t>Abu Dhabi </a:t>
+            </a:r>
+            <a:r>
+              <a:rPr lang="en-US" sz="1400" dirty="0">
+                <a:latin typeface="Open Sans" pitchFamily="2" charset="0"/>
+                <a:ea typeface="Open Sans" pitchFamily="2" charset="0"/>
+                <a:cs typeface="Open Sans" pitchFamily="2" charset="0"/>
+              </a:rPr>
+              <a:t>have the highest resignation rate.</a:t>
+            </a:r>
+          </a:p>
+          <a:p>
+            <a:pPr marL="285750" indent="-285750">
+              <a:buFont typeface="Arial" panose="020B0604020202020204" pitchFamily="34" charset="0"/>
+              <a:buChar char="•"/>
+            </a:pPr>
+            <a:r>
+              <a:rPr lang="en-US" sz="1400" dirty="0">
+                <a:latin typeface="Open Sans" pitchFamily="2" charset="0"/>
+                <a:ea typeface="Open Sans" pitchFamily="2" charset="0"/>
+                <a:cs typeface="Open Sans" pitchFamily="2" charset="0"/>
+              </a:rPr>
+              <a:t>Projects in </a:t>
+            </a:r>
+            <a:r>
+              <a:rPr lang="en-US" sz="1400" b="1" dirty="0">
+                <a:latin typeface="Open Sans" pitchFamily="2" charset="0"/>
+                <a:ea typeface="Open Sans" pitchFamily="2" charset="0"/>
+                <a:cs typeface="Open Sans" pitchFamily="2" charset="0"/>
+              </a:rPr>
+              <a:t>Riyadh</a:t>
+            </a:r>
+            <a:r>
+              <a:rPr lang="en-US" sz="1400" dirty="0">
+                <a:latin typeface="Open Sans" pitchFamily="2" charset="0"/>
+                <a:ea typeface="Open Sans" pitchFamily="2" charset="0"/>
+                <a:cs typeface="Open Sans" pitchFamily="2" charset="0"/>
+              </a:rPr>
+              <a:t> experience the highest workload variance.</a:t>
+            </a:r>
+          </a:p>
+          <a:p>
+            <a:pPr marL="285750" indent="-285750">
+              <a:buFont typeface="Arial" panose="020B0604020202020204" pitchFamily="34" charset="0"/>
+              <a:buChar char="•"/>
+            </a:pPr>
+            <a:r>
+              <a:rPr lang="en-US" sz="1400" dirty="0">
+                <a:latin typeface="Open Sans" pitchFamily="2" charset="0"/>
+                <a:ea typeface="Open Sans" pitchFamily="2" charset="0"/>
+                <a:cs typeface="Open Sans" pitchFamily="2" charset="0"/>
+              </a:rPr>
+              <a:t>Projects in </a:t>
+            </a:r>
+            <a:r>
+              <a:rPr lang="en-US" sz="1400" b="1" dirty="0">
+                <a:latin typeface="Open Sans" pitchFamily="2" charset="0"/>
+                <a:ea typeface="Open Sans" pitchFamily="2" charset="0"/>
+                <a:cs typeface="Open Sans" pitchFamily="2" charset="0"/>
+              </a:rPr>
+              <a:t>Jeddah</a:t>
+            </a:r>
+            <a:r>
+              <a:rPr lang="en-US" sz="1400" dirty="0">
+                <a:latin typeface="Open Sans" pitchFamily="2" charset="0"/>
+                <a:ea typeface="Open Sans" pitchFamily="2" charset="0"/>
+                <a:cs typeface="Open Sans" pitchFamily="2" charset="0"/>
+              </a:rPr>
+              <a:t> have the lowest workload variance and the lowest resignation rate.</a:t>
+            </a:r>
+          </a:p>
+          <a:p>
+            <a:pPr marL="285750" indent="-285750">
+              <a:buFont typeface="Arial" panose="020B0604020202020204" pitchFamily="34" charset="0"/>
+              <a:buChar char="•"/>
+            </a:pPr>
+            <a:r>
+              <a:rPr lang="en-US" sz="1400" dirty="0">
+                <a:latin typeface="Open Sans" pitchFamily="2" charset="0"/>
+                <a:ea typeface="Open Sans" pitchFamily="2" charset="0"/>
+                <a:cs typeface="Open Sans" pitchFamily="2" charset="0"/>
+              </a:rPr>
+              <a:t>Projects in </a:t>
+            </a:r>
+            <a:r>
+              <a:rPr lang="en-US" sz="1400" b="1" dirty="0">
+                <a:latin typeface="Open Sans" pitchFamily="2" charset="0"/>
+                <a:ea typeface="Open Sans" pitchFamily="2" charset="0"/>
+                <a:cs typeface="Open Sans" pitchFamily="2" charset="0"/>
+              </a:rPr>
+              <a:t>Dubai</a:t>
+            </a:r>
+            <a:r>
+              <a:rPr lang="en-US" sz="1400" dirty="0">
+                <a:latin typeface="Open Sans" pitchFamily="2" charset="0"/>
+                <a:ea typeface="Open Sans" pitchFamily="2" charset="0"/>
+                <a:cs typeface="Open Sans" pitchFamily="2" charset="0"/>
+              </a:rPr>
+              <a:t> have the highest completion rate.</a:t>
+            </a:r>
+          </a:p>
+        </p:txBody>
+      </p:sp>
+      <p:sp>
+        <p:nvSpPr>
+          <p:cNvPr id="7" name="TextBox 6">
+            <a:extLst>
+              <a:ext uri="{FF2B5EF4-FFF2-40B4-BE49-F238E27FC236}">
+                <a16:creationId xmlns:a16="http://schemas.microsoft.com/office/drawing/2014/main" id="{F4FB8700-BBE3-A5BC-EFE3-D708B2848610}"/>
+              </a:ext>
+            </a:extLst>
+          </p:cNvPr>
+          <p:cNvSpPr txBox="1"/>
+          <p:nvPr/>
+        </p:nvSpPr>
+        <p:spPr>
+          <a:xfrm>
+            <a:off x="591127" y="341745"/>
+            <a:ext cx="6751782" cy="646331"/>
+          </a:xfrm>
+          <a:prstGeom prst="rect">
+            <a:avLst/>
+          </a:prstGeom>
+          <a:noFill/>
+        </p:spPr>
+        <p:txBody>
+          <a:bodyPr wrap="square" rtlCol="0">
+            <a:spAutoFit/>
+          </a:bodyPr>
+          <a:lstStyle/>
+          <a:p>
+            <a:r>
+              <a:rPr lang="en-US" sz="3600" b="1" dirty="0">
+                <a:latin typeface="Open Sans" pitchFamily="2" charset="0"/>
+                <a:ea typeface="Open Sans" pitchFamily="2" charset="0"/>
+                <a:cs typeface="Open Sans" pitchFamily="2" charset="0"/>
+              </a:rPr>
+              <a:t>Communicating Results</a:t>
+            </a:r>
+            <a:endParaRPr lang="en-US" sz="3600" b="1" dirty="0"/>
+          </a:p>
+        </p:txBody>
+      </p:sp>
+      <p:sp>
+        <p:nvSpPr>
+          <p:cNvPr id="4" name="Rectangle: Rounded Corners 3">
+            <a:extLst>
+              <a:ext uri="{FF2B5EF4-FFF2-40B4-BE49-F238E27FC236}">
+                <a16:creationId xmlns:a16="http://schemas.microsoft.com/office/drawing/2014/main" id="{88E7D254-5FDF-E017-E9EA-C8182CD19EA4}"/>
+              </a:ext>
+            </a:extLst>
+          </p:cNvPr>
+          <p:cNvSpPr/>
+          <p:nvPr/>
+        </p:nvSpPr>
+        <p:spPr>
+          <a:xfrm>
+            <a:off x="5048574" y="2136943"/>
+            <a:ext cx="6883893" cy="3041639"/>
+          </a:xfrm>
+          <a:prstGeom prst="roundRect">
+            <a:avLst>
+              <a:gd name="adj" fmla="val 1291"/>
+            </a:avLst>
+          </a:prstGeom>
+          <a:ln>
+            <a:noFill/>
+          </a:ln>
+        </p:spPr>
+        <p:style>
+          <a:lnRef idx="2">
+            <a:schemeClr val="accent2"/>
+          </a:lnRef>
+          <a:fillRef idx="1">
+            <a:schemeClr val="lt1"/>
+          </a:fillRef>
+          <a:effectRef idx="0">
+            <a:schemeClr val="accent2"/>
+          </a:effectRef>
+          <a:fontRef idx="minor">
+            <a:schemeClr val="dk1"/>
+          </a:fontRef>
+        </p:style>
+        <p:txBody>
+          <a:bodyPr rtlCol="0" anchor="ctr"/>
+          <a:lstStyle/>
+          <a:p>
+            <a:pPr algn="ctr"/>
+            <a:endParaRPr lang="en-US"/>
+          </a:p>
+        </p:txBody>
+      </p:sp>
+      <p:pic>
+        <p:nvPicPr>
+          <p:cNvPr id="5" name="Picture 4">
+            <a:extLst>
+              <a:ext uri="{FF2B5EF4-FFF2-40B4-BE49-F238E27FC236}">
+                <a16:creationId xmlns:a16="http://schemas.microsoft.com/office/drawing/2014/main" id="{C40C7EF0-D8DF-2609-143A-E4B7EEC0CD6A}"/>
+              </a:ext>
+            </a:extLst>
+          </p:cNvPr>
+          <p:cNvPicPr>
+            <a:picLocks noChangeAspect="1"/>
+          </p:cNvPicPr>
+          <p:nvPr/>
+        </p:nvPicPr>
+        <p:blipFill>
+          <a:blip r:embed="rId2"/>
+          <a:stretch>
+            <a:fillRect/>
+          </a:stretch>
+        </p:blipFill>
+        <p:spPr>
+          <a:xfrm>
+            <a:off x="5098135" y="2290813"/>
+            <a:ext cx="6689720" cy="2737948"/>
+          </a:xfrm>
+          <a:prstGeom prst="rect">
+            <a:avLst/>
+          </a:prstGeom>
+        </p:spPr>
+      </p:pic>
+    </p:spTree>
+    <p:extLst>
+      <p:ext uri="{BB962C8B-B14F-4D97-AF65-F5344CB8AC3E}">
+        <p14:creationId xmlns:p14="http://schemas.microsoft.com/office/powerpoint/2010/main" val="3537588139"/>
+      </p:ext>
+    </p:extLst>
+  </p:cSld>
+  <p:clrMapOvr>
+    <a:masterClrMapping/>
+  </p:clrMapOvr>
+</p:sld>
+</file>
+
+<file path=ppt/slides/slide14.xml><?xml version="1.0" encoding="utf-8"?>
+<p:sld xmlns:a="http://schemas.openxmlformats.org/drawingml/2006/main" xmlns:r="http://schemas.openxmlformats.org/officeDocument/2006/relationships" xmlns:p="http://schemas.openxmlformats.org/presentationml/2006/main">
+  <p:cSld>
+    <p:spTree>
+      <p:nvGrpSpPr>
+        <p:cNvPr id="1" name="">
+          <a:extLst>
+            <a:ext uri="{FF2B5EF4-FFF2-40B4-BE49-F238E27FC236}">
               <a16:creationId xmlns:a16="http://schemas.microsoft.com/office/drawing/2014/main" id="{41527842-ECB1-D587-1D75-F6EFFF2E68A2}"/>
             </a:ext>
           </a:extLst>
@@ -10074,7 +10306,477 @@
 </p:sld>
 </file>
 
-<file path=ppt/slides/slide14.xml><?xml version="1.0" encoding="utf-8"?>
+<file path=ppt/slides/slide15.xml><?xml version="1.0" encoding="utf-8"?>
+<p:sld xmlns:a="http://schemas.openxmlformats.org/drawingml/2006/main" xmlns:r="http://schemas.openxmlformats.org/officeDocument/2006/relationships" xmlns:p="http://schemas.openxmlformats.org/presentationml/2006/main">
+  <p:cSld>
+    <p:spTree>
+      <p:nvGrpSpPr>
+        <p:cNvPr id="1" name="">
+          <a:extLst>
+            <a:ext uri="{FF2B5EF4-FFF2-40B4-BE49-F238E27FC236}">
+              <a16:creationId xmlns:a16="http://schemas.microsoft.com/office/drawing/2014/main" id="{373ACEAB-82C4-3157-3862-D87394CC41BA}"/>
+            </a:ext>
+          </a:extLst>
+        </p:cNvPr>
+        <p:cNvGrpSpPr/>
+        <p:nvPr/>
+      </p:nvGrpSpPr>
+      <p:grpSpPr>
+        <a:xfrm>
+          <a:off x="0" y="0"/>
+          <a:ext cx="0" cy="0"/>
+          <a:chOff x="0" y="0"/>
+          <a:chExt cx="0" cy="0"/>
+        </a:xfrm>
+      </p:grpSpPr>
+      <p:sp>
+        <p:nvSpPr>
+          <p:cNvPr id="6" name="TextBox 5">
+            <a:extLst>
+              <a:ext uri="{FF2B5EF4-FFF2-40B4-BE49-F238E27FC236}">
+                <a16:creationId xmlns:a16="http://schemas.microsoft.com/office/drawing/2014/main" id="{44305BFF-DF0D-A396-6BEC-730099F7D2FD}"/>
+              </a:ext>
+            </a:extLst>
+          </p:cNvPr>
+          <p:cNvSpPr txBox="1"/>
+          <p:nvPr/>
+        </p:nvSpPr>
+        <p:spPr>
+          <a:xfrm>
+            <a:off x="404145" y="2136944"/>
+            <a:ext cx="4446987" cy="2031325"/>
+          </a:xfrm>
+          <a:prstGeom prst="rect">
+            <a:avLst/>
+          </a:prstGeom>
+          <a:noFill/>
+        </p:spPr>
+        <p:txBody>
+          <a:bodyPr wrap="square" rtlCol="0">
+            <a:spAutoFit/>
+          </a:bodyPr>
+          <a:lstStyle/>
+          <a:p>
+            <a:pPr marL="285750" indent="-285750">
+              <a:buFont typeface="Arial" panose="020B0604020202020204" pitchFamily="34" charset="0"/>
+              <a:buChar char="•"/>
+            </a:pPr>
+            <a:r>
+              <a:rPr lang="en-US" sz="1400">
+                <a:latin typeface="Open Sans" pitchFamily="2" charset="0"/>
+                <a:ea typeface="Open Sans" pitchFamily="2" charset="0"/>
+                <a:cs typeface="Open Sans" pitchFamily="2" charset="0"/>
+              </a:rPr>
+              <a:t>We can see that projects below the trend line have a high employee shortage rate and a low completion rate.</a:t>
+            </a:r>
+          </a:p>
+          <a:p>
+            <a:pPr marL="285750" indent="-285750">
+              <a:buFont typeface="Arial" panose="020B0604020202020204" pitchFamily="34" charset="0"/>
+              <a:buChar char="•"/>
+            </a:pPr>
+            <a:r>
+              <a:rPr lang="en-US" sz="1400">
+                <a:latin typeface="Open Sans" pitchFamily="2" charset="0"/>
+                <a:ea typeface="Open Sans" pitchFamily="2" charset="0"/>
+                <a:cs typeface="Open Sans" pitchFamily="2" charset="0"/>
+              </a:rPr>
+              <a:t>The relationship between the completion rate and the workload variance rate is negatively correlated. That is, when the workload variance rate is high, the completion rate is low.</a:t>
+            </a:r>
+          </a:p>
+          <a:p>
+            <a:pPr marL="285750" indent="-285750">
+              <a:buFont typeface="Arial" panose="020B0604020202020204" pitchFamily="34" charset="0"/>
+              <a:buChar char="•"/>
+            </a:pPr>
+            <a:r>
+              <a:rPr lang="en-US" sz="1400">
+                <a:latin typeface="Open Sans" pitchFamily="2" charset="0"/>
+                <a:ea typeface="Open Sans" pitchFamily="2" charset="0"/>
+                <a:cs typeface="Open Sans" pitchFamily="2" charset="0"/>
+              </a:rPr>
+              <a:t>Projects that have a high employee shortage rate tend to have more workload variance.</a:t>
+            </a:r>
+            <a:endParaRPr lang="en-US" sz="1400" dirty="0">
+              <a:latin typeface="Open Sans" pitchFamily="2" charset="0"/>
+              <a:ea typeface="Open Sans" pitchFamily="2" charset="0"/>
+              <a:cs typeface="Open Sans" pitchFamily="2" charset="0"/>
+            </a:endParaRPr>
+          </a:p>
+        </p:txBody>
+      </p:sp>
+      <p:sp>
+        <p:nvSpPr>
+          <p:cNvPr id="7" name="TextBox 6">
+            <a:extLst>
+              <a:ext uri="{FF2B5EF4-FFF2-40B4-BE49-F238E27FC236}">
+                <a16:creationId xmlns:a16="http://schemas.microsoft.com/office/drawing/2014/main" id="{0902FC8E-5AD3-3AC8-97D1-BD0D5B8EAAD7}"/>
+              </a:ext>
+            </a:extLst>
+          </p:cNvPr>
+          <p:cNvSpPr txBox="1"/>
+          <p:nvPr/>
+        </p:nvSpPr>
+        <p:spPr>
+          <a:xfrm>
+            <a:off x="591127" y="341745"/>
+            <a:ext cx="6751782" cy="646331"/>
+          </a:xfrm>
+          <a:prstGeom prst="rect">
+            <a:avLst/>
+          </a:prstGeom>
+          <a:noFill/>
+        </p:spPr>
+        <p:txBody>
+          <a:bodyPr wrap="square" rtlCol="0">
+            <a:spAutoFit/>
+          </a:bodyPr>
+          <a:lstStyle/>
+          <a:p>
+            <a:r>
+              <a:rPr lang="en-US" sz="3600" b="1" dirty="0">
+                <a:latin typeface="Open Sans" pitchFamily="2" charset="0"/>
+                <a:ea typeface="Open Sans" pitchFamily="2" charset="0"/>
+                <a:cs typeface="Open Sans" pitchFamily="2" charset="0"/>
+              </a:rPr>
+              <a:t>Communicating Results</a:t>
+            </a:r>
+            <a:endParaRPr lang="en-US" sz="3600" b="1" dirty="0"/>
+          </a:p>
+        </p:txBody>
+      </p:sp>
+      <p:sp>
+        <p:nvSpPr>
+          <p:cNvPr id="4" name="Rectangle: Rounded Corners 3">
+            <a:extLst>
+              <a:ext uri="{FF2B5EF4-FFF2-40B4-BE49-F238E27FC236}">
+                <a16:creationId xmlns:a16="http://schemas.microsoft.com/office/drawing/2014/main" id="{CE58F1EC-BBC7-F2C9-A416-0B1984FB8A36}"/>
+              </a:ext>
+            </a:extLst>
+          </p:cNvPr>
+          <p:cNvSpPr/>
+          <p:nvPr/>
+        </p:nvSpPr>
+        <p:spPr>
+          <a:xfrm>
+            <a:off x="5048574" y="1421395"/>
+            <a:ext cx="5498713" cy="5094860"/>
+          </a:xfrm>
+          <a:prstGeom prst="roundRect">
+            <a:avLst>
+              <a:gd name="adj" fmla="val 1291"/>
+            </a:avLst>
+          </a:prstGeom>
+          <a:ln>
+            <a:noFill/>
+          </a:ln>
+        </p:spPr>
+        <p:style>
+          <a:lnRef idx="2">
+            <a:schemeClr val="accent2"/>
+          </a:lnRef>
+          <a:fillRef idx="1">
+            <a:schemeClr val="lt1"/>
+          </a:fillRef>
+          <a:effectRef idx="0">
+            <a:schemeClr val="accent2"/>
+          </a:effectRef>
+          <a:fontRef idx="minor">
+            <a:schemeClr val="dk1"/>
+          </a:fontRef>
+        </p:style>
+        <p:txBody>
+          <a:bodyPr rtlCol="0" anchor="ctr"/>
+          <a:lstStyle/>
+          <a:p>
+            <a:pPr algn="ctr"/>
+            <a:endParaRPr lang="en-US"/>
+          </a:p>
+        </p:txBody>
+      </p:sp>
+      <p:sp>
+        <p:nvSpPr>
+          <p:cNvPr id="3" name="TextBox 2">
+            <a:extLst>
+              <a:ext uri="{FF2B5EF4-FFF2-40B4-BE49-F238E27FC236}">
+                <a16:creationId xmlns:a16="http://schemas.microsoft.com/office/drawing/2014/main" id="{13323AB8-0A0A-D426-C8B1-8F4FE571CC43}"/>
+              </a:ext>
+            </a:extLst>
+          </p:cNvPr>
+          <p:cNvSpPr txBox="1"/>
+          <p:nvPr/>
+        </p:nvSpPr>
+        <p:spPr>
+          <a:xfrm>
+            <a:off x="404145" y="4168269"/>
+            <a:ext cx="4330817" cy="2031325"/>
+          </a:xfrm>
+          <a:prstGeom prst="rect">
+            <a:avLst/>
+          </a:prstGeom>
+          <a:noFill/>
+        </p:spPr>
+        <p:txBody>
+          <a:bodyPr wrap="square">
+            <a:spAutoFit/>
+          </a:bodyPr>
+          <a:lstStyle/>
+          <a:p>
+            <a:pPr marL="285750" indent="-285750">
+              <a:buFont typeface="Arial" panose="020B0604020202020204" pitchFamily="34" charset="0"/>
+              <a:buChar char="•"/>
+            </a:pPr>
+            <a:r>
+              <a:rPr lang="en-US" sz="1400" dirty="0">
+                <a:latin typeface="Open Sans" pitchFamily="2" charset="0"/>
+                <a:ea typeface="Open Sans" pitchFamily="2" charset="0"/>
+                <a:cs typeface="Open Sans" pitchFamily="2" charset="0"/>
+              </a:rPr>
+              <a:t>If we hover over one of the bubbles, we get more information about the project.</a:t>
+            </a:r>
+            <a:br>
+              <a:rPr lang="en-US" sz="1400" dirty="0">
+                <a:latin typeface="Open Sans" pitchFamily="2" charset="0"/>
+                <a:ea typeface="Open Sans" pitchFamily="2" charset="0"/>
+                <a:cs typeface="Open Sans" pitchFamily="2" charset="0"/>
+              </a:rPr>
+            </a:br>
+            <a:r>
+              <a:rPr lang="en-US" sz="1400" dirty="0">
+                <a:latin typeface="Open Sans" pitchFamily="2" charset="0"/>
+                <a:ea typeface="Open Sans" pitchFamily="2" charset="0"/>
+                <a:cs typeface="Open Sans" pitchFamily="2" charset="0"/>
+              </a:rPr>
+              <a:t>For example, this project is </a:t>
+            </a:r>
+            <a:r>
+              <a:rPr lang="en-US" sz="1400" b="1" dirty="0">
+                <a:latin typeface="Open Sans" pitchFamily="2" charset="0"/>
+                <a:ea typeface="Open Sans" pitchFamily="2" charset="0"/>
+                <a:cs typeface="Open Sans" pitchFamily="2" charset="0"/>
+              </a:rPr>
+              <a:t>Project P</a:t>
+            </a:r>
+            <a:r>
+              <a:rPr lang="en-US" sz="1400" dirty="0">
+                <a:latin typeface="Open Sans" pitchFamily="2" charset="0"/>
+                <a:ea typeface="Open Sans" pitchFamily="2" charset="0"/>
+                <a:cs typeface="Open Sans" pitchFamily="2" charset="0"/>
+              </a:rPr>
+              <a:t>, and it is located in </a:t>
+            </a:r>
+            <a:r>
+              <a:rPr lang="en-US" sz="1400" b="1" dirty="0">
+                <a:latin typeface="Open Sans" pitchFamily="2" charset="0"/>
+                <a:ea typeface="Open Sans" pitchFamily="2" charset="0"/>
+                <a:cs typeface="Open Sans" pitchFamily="2" charset="0"/>
+              </a:rPr>
+              <a:t>Dubai</a:t>
+            </a:r>
+            <a:r>
+              <a:rPr lang="en-US" sz="1400" dirty="0">
+                <a:latin typeface="Open Sans" pitchFamily="2" charset="0"/>
+                <a:ea typeface="Open Sans" pitchFamily="2" charset="0"/>
+                <a:cs typeface="Open Sans" pitchFamily="2" charset="0"/>
+              </a:rPr>
+              <a:t>. It has the </a:t>
+            </a:r>
+            <a:r>
+              <a:rPr lang="en-US" sz="1400" b="1" dirty="0">
+                <a:latin typeface="Open Sans" pitchFamily="2" charset="0"/>
+                <a:ea typeface="Open Sans" pitchFamily="2" charset="0"/>
+                <a:cs typeface="Open Sans" pitchFamily="2" charset="0"/>
+              </a:rPr>
+              <a:t>highest completion rate</a:t>
+            </a:r>
+            <a:r>
+              <a:rPr lang="en-US" sz="1400" dirty="0">
+                <a:latin typeface="Open Sans" pitchFamily="2" charset="0"/>
+                <a:ea typeface="Open Sans" pitchFamily="2" charset="0"/>
+                <a:cs typeface="Open Sans" pitchFamily="2" charset="0"/>
+              </a:rPr>
+              <a:t> of </a:t>
+            </a:r>
+            <a:r>
+              <a:rPr lang="en-US" sz="1400" b="1" dirty="0">
+                <a:latin typeface="Open Sans" pitchFamily="2" charset="0"/>
+                <a:ea typeface="Open Sans" pitchFamily="2" charset="0"/>
+                <a:cs typeface="Open Sans" pitchFamily="2" charset="0"/>
+              </a:rPr>
+              <a:t>35%</a:t>
+            </a:r>
+            <a:r>
+              <a:rPr lang="en-US" sz="1400" dirty="0">
+                <a:latin typeface="Open Sans" pitchFamily="2" charset="0"/>
+                <a:ea typeface="Open Sans" pitchFamily="2" charset="0"/>
+                <a:cs typeface="Open Sans" pitchFamily="2" charset="0"/>
+              </a:rPr>
+              <a:t> and a </a:t>
+            </a:r>
+            <a:r>
+              <a:rPr lang="en-US" sz="1400" b="1" dirty="0">
+                <a:latin typeface="Open Sans" pitchFamily="2" charset="0"/>
+                <a:ea typeface="Open Sans" pitchFamily="2" charset="0"/>
+                <a:cs typeface="Open Sans" pitchFamily="2" charset="0"/>
+              </a:rPr>
+              <a:t>low workload</a:t>
+            </a:r>
+            <a:r>
+              <a:rPr lang="en-US" sz="1400" dirty="0">
+                <a:latin typeface="Open Sans" pitchFamily="2" charset="0"/>
+                <a:ea typeface="Open Sans" pitchFamily="2" charset="0"/>
+                <a:cs typeface="Open Sans" pitchFamily="2" charset="0"/>
+              </a:rPr>
+              <a:t> of </a:t>
+            </a:r>
+            <a:r>
+              <a:rPr lang="en-US" sz="1400" b="1" dirty="0">
+                <a:latin typeface="Open Sans" pitchFamily="2" charset="0"/>
+                <a:ea typeface="Open Sans" pitchFamily="2" charset="0"/>
+                <a:cs typeface="Open Sans" pitchFamily="2" charset="0"/>
+              </a:rPr>
+              <a:t>3%</a:t>
+            </a:r>
+            <a:r>
+              <a:rPr lang="en-US" sz="1400" dirty="0">
+                <a:latin typeface="Open Sans" pitchFamily="2" charset="0"/>
+                <a:ea typeface="Open Sans" pitchFamily="2" charset="0"/>
+                <a:cs typeface="Open Sans" pitchFamily="2" charset="0"/>
+              </a:rPr>
+              <a:t>.</a:t>
+            </a:r>
+            <a:br>
+              <a:rPr lang="en-US" sz="1400" dirty="0">
+                <a:latin typeface="Open Sans" pitchFamily="2" charset="0"/>
+                <a:ea typeface="Open Sans" pitchFamily="2" charset="0"/>
+                <a:cs typeface="Open Sans" pitchFamily="2" charset="0"/>
+              </a:rPr>
+            </a:br>
+            <a:r>
+              <a:rPr lang="en-US" sz="1400" dirty="0">
+                <a:latin typeface="Open Sans" pitchFamily="2" charset="0"/>
+                <a:ea typeface="Open Sans" pitchFamily="2" charset="0"/>
+                <a:cs typeface="Open Sans" pitchFamily="2" charset="0"/>
+              </a:rPr>
+              <a:t>The </a:t>
+            </a:r>
+            <a:r>
+              <a:rPr lang="en-US" sz="1400" b="1" dirty="0">
+                <a:latin typeface="Open Sans" pitchFamily="2" charset="0"/>
+                <a:ea typeface="Open Sans" pitchFamily="2" charset="0"/>
+                <a:cs typeface="Open Sans" pitchFamily="2" charset="0"/>
+              </a:rPr>
+              <a:t>average employee tenure</a:t>
+            </a:r>
+            <a:r>
+              <a:rPr lang="en-US" sz="1400" dirty="0">
+                <a:latin typeface="Open Sans" pitchFamily="2" charset="0"/>
+                <a:ea typeface="Open Sans" pitchFamily="2" charset="0"/>
+                <a:cs typeface="Open Sans" pitchFamily="2" charset="0"/>
+              </a:rPr>
+              <a:t> is </a:t>
+            </a:r>
+            <a:r>
+              <a:rPr lang="en-US" sz="1400" b="1" dirty="0">
+                <a:latin typeface="Open Sans" pitchFamily="2" charset="0"/>
+                <a:ea typeface="Open Sans" pitchFamily="2" charset="0"/>
+                <a:cs typeface="Open Sans" pitchFamily="2" charset="0"/>
+              </a:rPr>
+              <a:t>13.66 months</a:t>
+            </a:r>
+            <a:r>
+              <a:rPr lang="en-US" sz="1400" dirty="0">
+                <a:latin typeface="Open Sans" pitchFamily="2" charset="0"/>
+                <a:ea typeface="Open Sans" pitchFamily="2" charset="0"/>
+                <a:cs typeface="Open Sans" pitchFamily="2" charset="0"/>
+              </a:rPr>
+              <a:t>, and the project started on </a:t>
+            </a:r>
+            <a:r>
+              <a:rPr lang="en-US" sz="1400" b="1" dirty="0">
+                <a:latin typeface="Open Sans" pitchFamily="2" charset="0"/>
+                <a:ea typeface="Open Sans" pitchFamily="2" charset="0"/>
+                <a:cs typeface="Open Sans" pitchFamily="2" charset="0"/>
+              </a:rPr>
+              <a:t>7/8/2023</a:t>
+            </a:r>
+            <a:r>
+              <a:rPr lang="en-US" sz="1400" dirty="0">
+                <a:latin typeface="Open Sans" pitchFamily="2" charset="0"/>
+                <a:ea typeface="Open Sans" pitchFamily="2" charset="0"/>
+                <a:cs typeface="Open Sans" pitchFamily="2" charset="0"/>
+              </a:rPr>
+              <a:t> and ended on </a:t>
+            </a:r>
+            <a:r>
+              <a:rPr lang="en-US" sz="1400" b="1" dirty="0">
+                <a:latin typeface="Open Sans" pitchFamily="2" charset="0"/>
+                <a:ea typeface="Open Sans" pitchFamily="2" charset="0"/>
+                <a:cs typeface="Open Sans" pitchFamily="2" charset="0"/>
+              </a:rPr>
+              <a:t>9/22/2023</a:t>
+            </a:r>
+            <a:r>
+              <a:rPr lang="en-US" sz="1400" dirty="0">
+                <a:latin typeface="Open Sans" pitchFamily="2" charset="0"/>
+                <a:ea typeface="Open Sans" pitchFamily="2" charset="0"/>
+                <a:cs typeface="Open Sans" pitchFamily="2" charset="0"/>
+              </a:rPr>
+              <a:t>.</a:t>
+            </a:r>
+          </a:p>
+        </p:txBody>
+      </p:sp>
+      <p:pic>
+        <p:nvPicPr>
+          <p:cNvPr id="9" name="Picture 8" descr="A screenshot of a graph&#10;&#10;AI-generated content may be incorrect.">
+            <a:extLst>
+              <a:ext uri="{FF2B5EF4-FFF2-40B4-BE49-F238E27FC236}">
+                <a16:creationId xmlns:a16="http://schemas.microsoft.com/office/drawing/2014/main" id="{13F16A65-81BA-EA61-CC77-79D9C1F50480}"/>
+              </a:ext>
+            </a:extLst>
+          </p:cNvPr>
+          <p:cNvPicPr>
+            <a:picLocks noChangeAspect="1"/>
+          </p:cNvPicPr>
+          <p:nvPr/>
+        </p:nvPicPr>
+        <p:blipFill>
+          <a:blip r:embed="rId2">
+            <a:extLst>
+              <a:ext uri="{28A0092B-C50C-407E-A947-70E740481C1C}">
+                <a14:useLocalDpi xmlns:a14="http://schemas.microsoft.com/office/drawing/2010/main" val="0"/>
+              </a:ext>
+            </a:extLst>
+          </a:blip>
+          <a:stretch>
+            <a:fillRect/>
+          </a:stretch>
+        </p:blipFill>
+        <p:spPr>
+          <a:xfrm>
+            <a:off x="5313042" y="1633031"/>
+            <a:ext cx="4969775" cy="4671588"/>
+          </a:xfrm>
+          <a:prstGeom prst="rect">
+            <a:avLst/>
+          </a:prstGeom>
+        </p:spPr>
+      </p:pic>
+    </p:spTree>
+    <p:extLst>
+      <p:ext uri="{BB962C8B-B14F-4D97-AF65-F5344CB8AC3E}">
+        <p14:creationId xmlns:p14="http://schemas.microsoft.com/office/powerpoint/2010/main" val="1972074850"/>
+      </p:ext>
+    </p:extLst>
+  </p:cSld>
+  <p:clrMapOvr>
+    <a:masterClrMapping/>
+  </p:clrMapOvr>
+</p:sld>
+</file>
+
+<file path=ppt/slides/slide16.xml><?xml version="1.0" encoding="utf-8"?>
 <p:sld xmlns:a="http://schemas.openxmlformats.org/drawingml/2006/main" xmlns:r="http://schemas.openxmlformats.org/officeDocument/2006/relationships" xmlns:p="http://schemas.openxmlformats.org/presentationml/2006/main">
   <p:cSld>
     <p:spTree>
@@ -10282,504 +10984,6 @@
     <p:extLst>
       <p:ext uri="{BB962C8B-B14F-4D97-AF65-F5344CB8AC3E}">
         <p14:creationId xmlns:p14="http://schemas.microsoft.com/office/powerpoint/2010/main" val="3557156902"/>
-      </p:ext>
-    </p:extLst>
-  </p:cSld>
-  <p:clrMapOvr>
-    <a:masterClrMapping/>
-  </p:clrMapOvr>
-</p:sld>
-</file>
-
-<file path=ppt/slides/slide15.xml><?xml version="1.0" encoding="utf-8"?>
-<p:sld xmlns:a="http://schemas.openxmlformats.org/drawingml/2006/main" xmlns:r="http://schemas.openxmlformats.org/officeDocument/2006/relationships" xmlns:p="http://schemas.openxmlformats.org/presentationml/2006/main">
-  <p:cSld>
-    <p:spTree>
-      <p:nvGrpSpPr>
-        <p:cNvPr id="1" name="">
-          <a:extLst>
-            <a:ext uri="{FF2B5EF4-FFF2-40B4-BE49-F238E27FC236}">
-              <a16:creationId xmlns:a16="http://schemas.microsoft.com/office/drawing/2014/main" id="{AE9A8575-4999-E1B0-F91E-4194DAC0965D}"/>
-            </a:ext>
-          </a:extLst>
-        </p:cNvPr>
-        <p:cNvGrpSpPr/>
-        <p:nvPr/>
-      </p:nvGrpSpPr>
-      <p:grpSpPr>
-        <a:xfrm>
-          <a:off x="0" y="0"/>
-          <a:ext cx="0" cy="0"/>
-          <a:chOff x="0" y="0"/>
-          <a:chExt cx="0" cy="0"/>
-        </a:xfrm>
-      </p:grpSpPr>
-      <p:sp>
-        <p:nvSpPr>
-          <p:cNvPr id="6" name="TextBox 5">
-            <a:extLst>
-              <a:ext uri="{FF2B5EF4-FFF2-40B4-BE49-F238E27FC236}">
-                <a16:creationId xmlns:a16="http://schemas.microsoft.com/office/drawing/2014/main" id="{67DAFC14-9906-73BE-E356-877E3F30D4AA}"/>
-              </a:ext>
-            </a:extLst>
-          </p:cNvPr>
-          <p:cNvSpPr txBox="1"/>
-          <p:nvPr/>
-        </p:nvSpPr>
-        <p:spPr>
-          <a:xfrm>
-            <a:off x="404145" y="2136944"/>
-            <a:ext cx="4446987" cy="738664"/>
-          </a:xfrm>
-          <a:prstGeom prst="rect">
-            <a:avLst/>
-          </a:prstGeom>
-          <a:noFill/>
-        </p:spPr>
-        <p:txBody>
-          <a:bodyPr wrap="square" rtlCol="0">
-            <a:spAutoFit/>
-          </a:bodyPr>
-          <a:lstStyle/>
-          <a:p>
-            <a:pPr marL="285750" indent="-285750">
-              <a:buFont typeface="Arial" panose="020B0604020202020204" pitchFamily="34" charset="0"/>
-              <a:buChar char="•"/>
-            </a:pPr>
-            <a:r>
-              <a:rPr lang="en-US" sz="1400" b="1" dirty="0">
-                <a:latin typeface="Open Sans" pitchFamily="2" charset="0"/>
-                <a:ea typeface="Open Sans" pitchFamily="2" charset="0"/>
-                <a:cs typeface="Open Sans" pitchFamily="2" charset="0"/>
-              </a:rPr>
-              <a:t>Supervisors</a:t>
-            </a:r>
-            <a:r>
-              <a:rPr lang="en-US" sz="1400" dirty="0">
-                <a:latin typeface="Open Sans" pitchFamily="2" charset="0"/>
-                <a:ea typeface="Open Sans" pitchFamily="2" charset="0"/>
-                <a:cs typeface="Open Sans" pitchFamily="2" charset="0"/>
-              </a:rPr>
-              <a:t> have the highest resignation rate and a low task completion rate, whereas </a:t>
-            </a:r>
-            <a:r>
-              <a:rPr lang="en-US" sz="1400" b="1" dirty="0">
-                <a:latin typeface="Open Sans" pitchFamily="2" charset="0"/>
-                <a:ea typeface="Open Sans" pitchFamily="2" charset="0"/>
-                <a:cs typeface="Open Sans" pitchFamily="2" charset="0"/>
-              </a:rPr>
-              <a:t>Coordinators</a:t>
-            </a:r>
-            <a:r>
-              <a:rPr lang="en-US" sz="1400" dirty="0">
-                <a:latin typeface="Open Sans" pitchFamily="2" charset="0"/>
-                <a:ea typeface="Open Sans" pitchFamily="2" charset="0"/>
-                <a:cs typeface="Open Sans" pitchFamily="2" charset="0"/>
-              </a:rPr>
-              <a:t> have the lowest resignation rate.</a:t>
-            </a:r>
-          </a:p>
-        </p:txBody>
-      </p:sp>
-      <p:sp>
-        <p:nvSpPr>
-          <p:cNvPr id="7" name="TextBox 6">
-            <a:extLst>
-              <a:ext uri="{FF2B5EF4-FFF2-40B4-BE49-F238E27FC236}">
-                <a16:creationId xmlns:a16="http://schemas.microsoft.com/office/drawing/2014/main" id="{0AEABB68-67E8-EC75-E0EF-D2C0FCD83876}"/>
-              </a:ext>
-            </a:extLst>
-          </p:cNvPr>
-          <p:cNvSpPr txBox="1"/>
-          <p:nvPr/>
-        </p:nvSpPr>
-        <p:spPr>
-          <a:xfrm>
-            <a:off x="591127" y="341745"/>
-            <a:ext cx="6751782" cy="646331"/>
-          </a:xfrm>
-          <a:prstGeom prst="rect">
-            <a:avLst/>
-          </a:prstGeom>
-          <a:noFill/>
-        </p:spPr>
-        <p:txBody>
-          <a:bodyPr wrap="square" rtlCol="0">
-            <a:spAutoFit/>
-          </a:bodyPr>
-          <a:lstStyle/>
-          <a:p>
-            <a:r>
-              <a:rPr lang="en-US" sz="3600" b="1" dirty="0">
-                <a:latin typeface="Open Sans" pitchFamily="2" charset="0"/>
-                <a:ea typeface="Open Sans" pitchFamily="2" charset="0"/>
-                <a:cs typeface="Open Sans" pitchFamily="2" charset="0"/>
-              </a:rPr>
-              <a:t>Communicating Results</a:t>
-            </a:r>
-            <a:endParaRPr lang="en-US" sz="3600" b="1" dirty="0"/>
-          </a:p>
-        </p:txBody>
-      </p:sp>
-      <p:sp>
-        <p:nvSpPr>
-          <p:cNvPr id="4" name="Rectangle: Rounded Corners 3">
-            <a:extLst>
-              <a:ext uri="{FF2B5EF4-FFF2-40B4-BE49-F238E27FC236}">
-                <a16:creationId xmlns:a16="http://schemas.microsoft.com/office/drawing/2014/main" id="{1A943B87-A6C5-8113-A6DA-9174A29AC919}"/>
-              </a:ext>
-            </a:extLst>
-          </p:cNvPr>
-          <p:cNvSpPr/>
-          <p:nvPr/>
-        </p:nvSpPr>
-        <p:spPr>
-          <a:xfrm>
-            <a:off x="5048574" y="2136943"/>
-            <a:ext cx="6883893" cy="3041639"/>
-          </a:xfrm>
-          <a:prstGeom prst="roundRect">
-            <a:avLst>
-              <a:gd name="adj" fmla="val 1291"/>
-            </a:avLst>
-          </a:prstGeom>
-          <a:ln>
-            <a:noFill/>
-          </a:ln>
-        </p:spPr>
-        <p:style>
-          <a:lnRef idx="2">
-            <a:schemeClr val="accent2"/>
-          </a:lnRef>
-          <a:fillRef idx="1">
-            <a:schemeClr val="lt1"/>
-          </a:fillRef>
-          <a:effectRef idx="0">
-            <a:schemeClr val="accent2"/>
-          </a:effectRef>
-          <a:fontRef idx="minor">
-            <a:schemeClr val="dk1"/>
-          </a:fontRef>
-        </p:style>
-        <p:txBody>
-          <a:bodyPr rtlCol="0" anchor="ctr"/>
-          <a:lstStyle/>
-          <a:p>
-            <a:pPr algn="ctr"/>
-            <a:endParaRPr lang="en-US"/>
-          </a:p>
-        </p:txBody>
-      </p:sp>
-      <p:pic>
-        <p:nvPicPr>
-          <p:cNvPr id="5" name="Picture 4">
-            <a:extLst>
-              <a:ext uri="{FF2B5EF4-FFF2-40B4-BE49-F238E27FC236}">
-                <a16:creationId xmlns:a16="http://schemas.microsoft.com/office/drawing/2014/main" id="{D8139E11-69D1-4A54-8DB2-C546151B4A47}"/>
-              </a:ext>
-            </a:extLst>
-          </p:cNvPr>
-          <p:cNvPicPr>
-            <a:picLocks noChangeAspect="1"/>
-          </p:cNvPicPr>
-          <p:nvPr/>
-        </p:nvPicPr>
-        <p:blipFill>
-          <a:blip r:embed="rId2"/>
-          <a:stretch>
-            <a:fillRect/>
-          </a:stretch>
-        </p:blipFill>
-        <p:spPr>
-          <a:xfrm>
-            <a:off x="5147117" y="2280882"/>
-            <a:ext cx="6550204" cy="2753759"/>
-          </a:xfrm>
-          <a:prstGeom prst="rect">
-            <a:avLst/>
-          </a:prstGeom>
-        </p:spPr>
-      </p:pic>
-    </p:spTree>
-    <p:extLst>
-      <p:ext uri="{BB962C8B-B14F-4D97-AF65-F5344CB8AC3E}">
-        <p14:creationId xmlns:p14="http://schemas.microsoft.com/office/powerpoint/2010/main" val="3193205242"/>
-      </p:ext>
-    </p:extLst>
-  </p:cSld>
-  <p:clrMapOvr>
-    <a:masterClrMapping/>
-  </p:clrMapOvr>
-</p:sld>
-</file>
-
-<file path=ppt/slides/slide16.xml><?xml version="1.0" encoding="utf-8"?>
-<p:sld xmlns:a="http://schemas.openxmlformats.org/drawingml/2006/main" xmlns:r="http://schemas.openxmlformats.org/officeDocument/2006/relationships" xmlns:p="http://schemas.openxmlformats.org/presentationml/2006/main">
-  <p:cSld>
-    <p:spTree>
-      <p:nvGrpSpPr>
-        <p:cNvPr id="1" name="">
-          <a:extLst>
-            <a:ext uri="{FF2B5EF4-FFF2-40B4-BE49-F238E27FC236}">
-              <a16:creationId xmlns:a16="http://schemas.microsoft.com/office/drawing/2014/main" id="{09B82DFF-8977-D8C0-7903-7193A23D6260}"/>
-            </a:ext>
-          </a:extLst>
-        </p:cNvPr>
-        <p:cNvGrpSpPr/>
-        <p:nvPr/>
-      </p:nvGrpSpPr>
-      <p:grpSpPr>
-        <a:xfrm>
-          <a:off x="0" y="0"/>
-          <a:ext cx="0" cy="0"/>
-          <a:chOff x="0" y="0"/>
-          <a:chExt cx="0" cy="0"/>
-        </a:xfrm>
-      </p:grpSpPr>
-      <p:sp>
-        <p:nvSpPr>
-          <p:cNvPr id="6" name="TextBox 5">
-            <a:extLst>
-              <a:ext uri="{FF2B5EF4-FFF2-40B4-BE49-F238E27FC236}">
-                <a16:creationId xmlns:a16="http://schemas.microsoft.com/office/drawing/2014/main" id="{FB2D2B58-BA24-11A5-D10A-6346F7C4DB9F}"/>
-              </a:ext>
-            </a:extLst>
-          </p:cNvPr>
-          <p:cNvSpPr txBox="1"/>
-          <p:nvPr/>
-        </p:nvSpPr>
-        <p:spPr>
-          <a:xfrm>
-            <a:off x="404145" y="2136944"/>
-            <a:ext cx="4446987" cy="1384995"/>
-          </a:xfrm>
-          <a:prstGeom prst="rect">
-            <a:avLst/>
-          </a:prstGeom>
-          <a:noFill/>
-        </p:spPr>
-        <p:txBody>
-          <a:bodyPr wrap="square" rtlCol="0">
-            <a:spAutoFit/>
-          </a:bodyPr>
-          <a:lstStyle/>
-          <a:p>
-            <a:pPr marL="285750" indent="-285750">
-              <a:buFont typeface="Arial" panose="020B0604020202020204" pitchFamily="34" charset="0"/>
-              <a:buChar char="•"/>
-            </a:pPr>
-            <a:r>
-              <a:rPr lang="en-US" sz="1400" dirty="0">
-                <a:latin typeface="Open Sans" pitchFamily="2" charset="0"/>
-                <a:ea typeface="Open Sans" pitchFamily="2" charset="0"/>
-                <a:cs typeface="Open Sans" pitchFamily="2" charset="0"/>
-              </a:rPr>
-              <a:t>The </a:t>
-            </a:r>
-            <a:r>
-              <a:rPr lang="en-US" sz="1400" b="1" dirty="0">
-                <a:latin typeface="Open Sans" pitchFamily="2" charset="0"/>
-                <a:ea typeface="Open Sans" pitchFamily="2" charset="0"/>
-                <a:cs typeface="Open Sans" pitchFamily="2" charset="0"/>
-              </a:rPr>
-              <a:t>Field Service </a:t>
-            </a:r>
-            <a:r>
-              <a:rPr lang="en-US" sz="1400" dirty="0">
-                <a:latin typeface="Open Sans" pitchFamily="2" charset="0"/>
-                <a:ea typeface="Open Sans" pitchFamily="2" charset="0"/>
-                <a:cs typeface="Open Sans" pitchFamily="2" charset="0"/>
-              </a:rPr>
-              <a:t>department has the highest resignation rate, whereas the </a:t>
-            </a:r>
-            <a:r>
-              <a:rPr lang="en-US" sz="1400" b="1" dirty="0">
-                <a:latin typeface="Open Sans" pitchFamily="2" charset="0"/>
-                <a:ea typeface="Open Sans" pitchFamily="2" charset="0"/>
-                <a:cs typeface="Open Sans" pitchFamily="2" charset="0"/>
-              </a:rPr>
-              <a:t>Admin</a:t>
-            </a:r>
-            <a:r>
-              <a:rPr lang="en-US" sz="1400" dirty="0">
-                <a:latin typeface="Open Sans" pitchFamily="2" charset="0"/>
-                <a:ea typeface="Open Sans" pitchFamily="2" charset="0"/>
-                <a:cs typeface="Open Sans" pitchFamily="2" charset="0"/>
-              </a:rPr>
-              <a:t> department has the lowest.</a:t>
-            </a:r>
-          </a:p>
-          <a:p>
-            <a:pPr marL="285750" indent="-285750">
-              <a:buFont typeface="Arial" panose="020B0604020202020204" pitchFamily="34" charset="0"/>
-              <a:buChar char="•"/>
-            </a:pPr>
-            <a:r>
-              <a:rPr lang="en-US" sz="1400" dirty="0">
-                <a:latin typeface="Open Sans" pitchFamily="2" charset="0"/>
-                <a:ea typeface="Open Sans" pitchFamily="2" charset="0"/>
-                <a:cs typeface="Open Sans" pitchFamily="2" charset="0"/>
-              </a:rPr>
-              <a:t>The </a:t>
-            </a:r>
-            <a:r>
-              <a:rPr lang="en-US" sz="1400" b="1" dirty="0">
-                <a:latin typeface="Open Sans" pitchFamily="2" charset="0"/>
-                <a:ea typeface="Open Sans" pitchFamily="2" charset="0"/>
-                <a:cs typeface="Open Sans" pitchFamily="2" charset="0"/>
-              </a:rPr>
-              <a:t>HR</a:t>
-            </a:r>
-            <a:r>
-              <a:rPr lang="en-US" sz="1400" dirty="0">
-                <a:latin typeface="Open Sans" pitchFamily="2" charset="0"/>
-                <a:ea typeface="Open Sans" pitchFamily="2" charset="0"/>
-                <a:cs typeface="Open Sans" pitchFamily="2" charset="0"/>
-              </a:rPr>
-              <a:t> department has the lowest task completion rate, whereas the </a:t>
-            </a:r>
-            <a:r>
-              <a:rPr lang="en-US" sz="1400" b="1" dirty="0">
-                <a:latin typeface="Open Sans" pitchFamily="2" charset="0"/>
-                <a:ea typeface="Open Sans" pitchFamily="2" charset="0"/>
-                <a:cs typeface="Open Sans" pitchFamily="2" charset="0"/>
-              </a:rPr>
-              <a:t>Operations</a:t>
-            </a:r>
-            <a:r>
-              <a:rPr lang="en-US" sz="1400" dirty="0">
-                <a:latin typeface="Open Sans" pitchFamily="2" charset="0"/>
-                <a:ea typeface="Open Sans" pitchFamily="2" charset="0"/>
-                <a:cs typeface="Open Sans" pitchFamily="2" charset="0"/>
-              </a:rPr>
-              <a:t> department has the highest.</a:t>
-            </a:r>
-          </a:p>
-        </p:txBody>
-      </p:sp>
-      <p:sp>
-        <p:nvSpPr>
-          <p:cNvPr id="7" name="TextBox 6">
-            <a:extLst>
-              <a:ext uri="{FF2B5EF4-FFF2-40B4-BE49-F238E27FC236}">
-                <a16:creationId xmlns:a16="http://schemas.microsoft.com/office/drawing/2014/main" id="{1DF10D82-840B-2A81-1D9F-C12AECAF423F}"/>
-              </a:ext>
-            </a:extLst>
-          </p:cNvPr>
-          <p:cNvSpPr txBox="1"/>
-          <p:nvPr/>
-        </p:nvSpPr>
-        <p:spPr>
-          <a:xfrm>
-            <a:off x="591127" y="341745"/>
-            <a:ext cx="6751782" cy="646331"/>
-          </a:xfrm>
-          <a:prstGeom prst="rect">
-            <a:avLst/>
-          </a:prstGeom>
-          <a:noFill/>
-        </p:spPr>
-        <p:txBody>
-          <a:bodyPr wrap="square" rtlCol="0">
-            <a:spAutoFit/>
-          </a:bodyPr>
-          <a:lstStyle/>
-          <a:p>
-            <a:r>
-              <a:rPr lang="en-US" sz="3600" b="1" dirty="0">
-                <a:latin typeface="Open Sans" pitchFamily="2" charset="0"/>
-                <a:ea typeface="Open Sans" pitchFamily="2" charset="0"/>
-                <a:cs typeface="Open Sans" pitchFamily="2" charset="0"/>
-              </a:rPr>
-              <a:t>Communicating Results</a:t>
-            </a:r>
-            <a:endParaRPr lang="en-US" sz="3600" b="1" dirty="0"/>
-          </a:p>
-        </p:txBody>
-      </p:sp>
-      <p:sp>
-        <p:nvSpPr>
-          <p:cNvPr id="4" name="Rectangle: Rounded Corners 3">
-            <a:extLst>
-              <a:ext uri="{FF2B5EF4-FFF2-40B4-BE49-F238E27FC236}">
-                <a16:creationId xmlns:a16="http://schemas.microsoft.com/office/drawing/2014/main" id="{C13C465E-58DE-92D1-DB9C-3DD3320A7F6A}"/>
-              </a:ext>
-            </a:extLst>
-          </p:cNvPr>
-          <p:cNvSpPr/>
-          <p:nvPr/>
-        </p:nvSpPr>
-        <p:spPr>
-          <a:xfrm>
-            <a:off x="5048574" y="2136943"/>
-            <a:ext cx="6883893" cy="3041639"/>
-          </a:xfrm>
-          <a:prstGeom prst="roundRect">
-            <a:avLst>
-              <a:gd name="adj" fmla="val 1291"/>
-            </a:avLst>
-          </a:prstGeom>
-          <a:ln>
-            <a:noFill/>
-          </a:ln>
-        </p:spPr>
-        <p:style>
-          <a:lnRef idx="2">
-            <a:schemeClr val="accent2"/>
-          </a:lnRef>
-          <a:fillRef idx="1">
-            <a:schemeClr val="lt1"/>
-          </a:fillRef>
-          <a:effectRef idx="0">
-            <a:schemeClr val="accent2"/>
-          </a:effectRef>
-          <a:fontRef idx="minor">
-            <a:schemeClr val="dk1"/>
-          </a:fontRef>
-        </p:style>
-        <p:txBody>
-          <a:bodyPr rtlCol="0" anchor="ctr"/>
-          <a:lstStyle/>
-          <a:p>
-            <a:pPr algn="ctr"/>
-            <a:endParaRPr lang="en-US"/>
-          </a:p>
-        </p:txBody>
-      </p:sp>
-      <p:pic>
-        <p:nvPicPr>
-          <p:cNvPr id="3" name="Picture 2">
-            <a:extLst>
-              <a:ext uri="{FF2B5EF4-FFF2-40B4-BE49-F238E27FC236}">
-                <a16:creationId xmlns:a16="http://schemas.microsoft.com/office/drawing/2014/main" id="{A8B52C00-056A-11B1-745D-AA6990ECE201}"/>
-              </a:ext>
-            </a:extLst>
-          </p:cNvPr>
-          <p:cNvPicPr>
-            <a:picLocks noChangeAspect="1"/>
-          </p:cNvPicPr>
-          <p:nvPr/>
-        </p:nvPicPr>
-        <p:blipFill>
-          <a:blip r:embed="rId2"/>
-          <a:stretch>
-            <a:fillRect/>
-          </a:stretch>
-        </p:blipFill>
-        <p:spPr>
-          <a:xfrm>
-            <a:off x="5187636" y="2271806"/>
-            <a:ext cx="6600219" cy="2771911"/>
-          </a:xfrm>
-          <a:prstGeom prst="rect">
-            <a:avLst/>
-          </a:prstGeom>
-        </p:spPr>
-      </p:pic>
-    </p:spTree>
-    <p:extLst>
-      <p:ext uri="{BB962C8B-B14F-4D97-AF65-F5344CB8AC3E}">
-        <p14:creationId xmlns:p14="http://schemas.microsoft.com/office/powerpoint/2010/main" val="2440980659"/>
       </p:ext>
     </p:extLst>
   </p:cSld>
@@ -10833,10 +11037,10 @@
       </p:grpSpPr>
       <p:pic>
         <p:nvPicPr>
-          <p:cNvPr id="3" name="Picture 2">
+          <p:cNvPr id="4" name="Picture 3">
             <a:extLst>
               <a:ext uri="{FF2B5EF4-FFF2-40B4-BE49-F238E27FC236}">
-                <a16:creationId xmlns:a16="http://schemas.microsoft.com/office/drawing/2014/main" id="{FAF419D6-D783-C19A-BAEC-ADD068EAD59E}"/>
+                <a16:creationId xmlns:a16="http://schemas.microsoft.com/office/drawing/2014/main" id="{19B951F8-2DC0-1C2B-A15F-548181E8BAAC}"/>
               </a:ext>
             </a:extLst>
           </p:cNvPr>
@@ -11541,7 +11745,7 @@
         <p:cNvPr id="1" name="">
           <a:extLst>
             <a:ext uri="{FF2B5EF4-FFF2-40B4-BE49-F238E27FC236}">
-              <a16:creationId xmlns:a16="http://schemas.microsoft.com/office/drawing/2014/main" id="{86B378FC-ADE7-A1FC-D9A5-04E5E8A36FA9}"/>
+              <a16:creationId xmlns:a16="http://schemas.microsoft.com/office/drawing/2014/main" id="{09B82DFF-8977-D8C0-7903-7193A23D6260}"/>
             </a:ext>
           </a:extLst>
         </p:cNvPr>
@@ -11561,7 +11765,7 @@
           <p:cNvPr id="6" name="TextBox 5">
             <a:extLst>
               <a:ext uri="{FF2B5EF4-FFF2-40B4-BE49-F238E27FC236}">
-                <a16:creationId xmlns:a16="http://schemas.microsoft.com/office/drawing/2014/main" id="{A0CFCC0A-4C39-44E5-9223-FF03BE566F33}"/>
+                <a16:creationId xmlns:a16="http://schemas.microsoft.com/office/drawing/2014/main" id="{FB2D2B58-BA24-11A5-D10A-6346F7C4DB9F}"/>
               </a:ext>
             </a:extLst>
           </p:cNvPr>
@@ -11571,7 +11775,7 @@
         <p:spPr>
           <a:xfrm>
             <a:off x="404145" y="2136944"/>
-            <a:ext cx="4446987" cy="1815882"/>
+            <a:ext cx="4446987" cy="1384995"/>
           </a:xfrm>
           <a:prstGeom prst="rect">
             <a:avLst/>
@@ -11594,7 +11798,7 @@
                 <a:ea typeface="Open Sans" pitchFamily="2" charset="0"/>
                 <a:cs typeface="Open Sans" pitchFamily="2" charset="0"/>
               </a:rPr>
-              <a:t>Projects in </a:t>
+              <a:t>The </a:t>
             </a:r>
             <a:r>
               <a:rPr lang="en-US" sz="1400" b="1" dirty="0">
@@ -11602,7 +11806,7 @@
                 <a:ea typeface="Open Sans" pitchFamily="2" charset="0"/>
                 <a:cs typeface="Open Sans" pitchFamily="2" charset="0"/>
               </a:rPr>
-              <a:t>Abu Dhabi </a:t>
+              <a:t>Field Service </a:t>
             </a:r>
             <a:r>
               <a:rPr lang="en-US" sz="1400" dirty="0">
@@ -11610,7 +11814,23 @@
                 <a:ea typeface="Open Sans" pitchFamily="2" charset="0"/>
                 <a:cs typeface="Open Sans" pitchFamily="2" charset="0"/>
               </a:rPr>
-              <a:t>have the highest resignation rate.</a:t>
+              <a:t>department has the highest resignation rate, whereas the </a:t>
+            </a:r>
+            <a:r>
+              <a:rPr lang="en-US" sz="1400" b="1" dirty="0">
+                <a:latin typeface="Open Sans" pitchFamily="2" charset="0"/>
+                <a:ea typeface="Open Sans" pitchFamily="2" charset="0"/>
+                <a:cs typeface="Open Sans" pitchFamily="2" charset="0"/>
+              </a:rPr>
+              <a:t>Admin</a:t>
+            </a:r>
+            <a:r>
+              <a:rPr lang="en-US" sz="1400" dirty="0">
+                <a:latin typeface="Open Sans" pitchFamily="2" charset="0"/>
+                <a:ea typeface="Open Sans" pitchFamily="2" charset="0"/>
+                <a:cs typeface="Open Sans" pitchFamily="2" charset="0"/>
+              </a:rPr>
+              <a:t> department has the lowest.</a:t>
             </a:r>
           </a:p>
           <a:p>
@@ -11624,7 +11844,7 @@
                 <a:ea typeface="Open Sans" pitchFamily="2" charset="0"/>
                 <a:cs typeface="Open Sans" pitchFamily="2" charset="0"/>
               </a:rPr>
-              <a:t>Projects in </a:t>
+              <a:t>The </a:t>
             </a:r>
             <a:r>
               <a:rPr lang="en-US" sz="1400" b="1" dirty="0">
@@ -11632,7 +11852,7 @@
                 <a:ea typeface="Open Sans" pitchFamily="2" charset="0"/>
                 <a:cs typeface="Open Sans" pitchFamily="2" charset="0"/>
               </a:rPr>
-              <a:t>Riyadh</a:t>
+              <a:t>HR</a:t>
             </a:r>
             <a:r>
               <a:rPr lang="en-US" sz="1400" dirty="0">
@@ -11640,67 +11860,23 @@
                 <a:ea typeface="Open Sans" pitchFamily="2" charset="0"/>
                 <a:cs typeface="Open Sans" pitchFamily="2" charset="0"/>
               </a:rPr>
-              <a:t> experience the highest workload variance.</a:t>
-            </a:r>
-          </a:p>
-          <a:p>
-            <a:pPr marL="285750" indent="-285750">
-              <a:buFont typeface="Arial" panose="020B0604020202020204" pitchFamily="34" charset="0"/>
-              <a:buChar char="•"/>
-            </a:pPr>
+              <a:t> department has the lowest task completion rate, whereas the </a:t>
+            </a:r>
+            <a:r>
+              <a:rPr lang="en-US" sz="1400" b="1" dirty="0">
+                <a:latin typeface="Open Sans" pitchFamily="2" charset="0"/>
+                <a:ea typeface="Open Sans" pitchFamily="2" charset="0"/>
+                <a:cs typeface="Open Sans" pitchFamily="2" charset="0"/>
+              </a:rPr>
+              <a:t>Operations</a:t>
+            </a:r>
             <a:r>
               <a:rPr lang="en-US" sz="1400" dirty="0">
                 <a:latin typeface="Open Sans" pitchFamily="2" charset="0"/>
                 <a:ea typeface="Open Sans" pitchFamily="2" charset="0"/>
                 <a:cs typeface="Open Sans" pitchFamily="2" charset="0"/>
               </a:rPr>
-              <a:t>Projects in </a:t>
-            </a:r>
-            <a:r>
-              <a:rPr lang="en-US" sz="1400" b="1" dirty="0">
-                <a:latin typeface="Open Sans" pitchFamily="2" charset="0"/>
-                <a:ea typeface="Open Sans" pitchFamily="2" charset="0"/>
-                <a:cs typeface="Open Sans" pitchFamily="2" charset="0"/>
-              </a:rPr>
-              <a:t>Jeddah</a:t>
-            </a:r>
-            <a:r>
-              <a:rPr lang="en-US" sz="1400" dirty="0">
-                <a:latin typeface="Open Sans" pitchFamily="2" charset="0"/>
-                <a:ea typeface="Open Sans" pitchFamily="2" charset="0"/>
-                <a:cs typeface="Open Sans" pitchFamily="2" charset="0"/>
-              </a:rPr>
-              <a:t> have the lowest workload variance and the lowest resignation rate.</a:t>
-            </a:r>
-          </a:p>
-          <a:p>
-            <a:pPr marL="285750" indent="-285750">
-              <a:buFont typeface="Arial" panose="020B0604020202020204" pitchFamily="34" charset="0"/>
-              <a:buChar char="•"/>
-            </a:pPr>
-            <a:r>
-              <a:rPr lang="en-US" sz="1400" dirty="0">
-                <a:latin typeface="Open Sans" pitchFamily="2" charset="0"/>
-                <a:ea typeface="Open Sans" pitchFamily="2" charset="0"/>
-                <a:cs typeface="Open Sans" pitchFamily="2" charset="0"/>
-              </a:rPr>
-              <a:t>Projects in </a:t>
-            </a:r>
-            <a:r>
-              <a:rPr lang="en-US" sz="1400" b="1" dirty="0">
-                <a:latin typeface="Open Sans" pitchFamily="2" charset="0"/>
-                <a:ea typeface="Open Sans" pitchFamily="2" charset="0"/>
-                <a:cs typeface="Open Sans" pitchFamily="2" charset="0"/>
-              </a:rPr>
-              <a:t>Dubai</a:t>
-            </a:r>
-            <a:r>
-              <a:rPr lang="en-US" sz="1400" dirty="0">
-                <a:latin typeface="Open Sans" pitchFamily="2" charset="0"/>
-                <a:ea typeface="Open Sans" pitchFamily="2" charset="0"/>
-                <a:cs typeface="Open Sans" pitchFamily="2" charset="0"/>
-              </a:rPr>
-              <a:t> have the highest completion rate.</a:t>
+              <a:t> department has the highest.</a:t>
             </a:r>
           </a:p>
         </p:txBody>
@@ -11710,7 +11886,7 @@
           <p:cNvPr id="7" name="TextBox 6">
             <a:extLst>
               <a:ext uri="{FF2B5EF4-FFF2-40B4-BE49-F238E27FC236}">
-                <a16:creationId xmlns:a16="http://schemas.microsoft.com/office/drawing/2014/main" id="{F4FB8700-BBE3-A5BC-EFE3-D708B2848610}"/>
+                <a16:creationId xmlns:a16="http://schemas.microsoft.com/office/drawing/2014/main" id="{1DF10D82-840B-2A81-1D9F-C12AECAF423F}"/>
               </a:ext>
             </a:extLst>
           </p:cNvPr>
@@ -11750,7 +11926,7 @@
           <p:cNvPr id="4" name="Rectangle: Rounded Corners 3">
             <a:extLst>
               <a:ext uri="{FF2B5EF4-FFF2-40B4-BE49-F238E27FC236}">
-                <a16:creationId xmlns:a16="http://schemas.microsoft.com/office/drawing/2014/main" id="{88E7D254-5FDF-E017-E9EA-C8182CD19EA4}"/>
+                <a16:creationId xmlns:a16="http://schemas.microsoft.com/office/drawing/2014/main" id="{C13C465E-58DE-92D1-DB9C-3DD3320A7F6A}"/>
               </a:ext>
             </a:extLst>
           </p:cNvPr>
@@ -11796,10 +11972,10 @@
       </p:sp>
       <p:pic>
         <p:nvPicPr>
-          <p:cNvPr id="5" name="Picture 4">
+          <p:cNvPr id="3" name="Picture 2">
             <a:extLst>
               <a:ext uri="{FF2B5EF4-FFF2-40B4-BE49-F238E27FC236}">
-                <a16:creationId xmlns:a16="http://schemas.microsoft.com/office/drawing/2014/main" id="{C40C7EF0-D8DF-2609-143A-E4B7EEC0CD6A}"/>
+                <a16:creationId xmlns:a16="http://schemas.microsoft.com/office/drawing/2014/main" id="{A8B52C00-056A-11B1-745D-AA6990ECE201}"/>
               </a:ext>
             </a:extLst>
           </p:cNvPr>
@@ -11816,8 +11992,8 @@
         </p:blipFill>
         <p:spPr>
           <a:xfrm>
-            <a:off x="5098135" y="2290813"/>
-            <a:ext cx="6689720" cy="2737948"/>
+            <a:off x="5187636" y="2271806"/>
+            <a:ext cx="6600219" cy="2771911"/>
           </a:xfrm>
           <a:prstGeom prst="rect">
             <a:avLst/>
@@ -11827,7 +12003,7 @@
     </p:spTree>
     <p:extLst>
       <p:ext uri="{BB962C8B-B14F-4D97-AF65-F5344CB8AC3E}">
-        <p14:creationId xmlns:p14="http://schemas.microsoft.com/office/powerpoint/2010/main" val="3537588139"/>
+        <p14:creationId xmlns:p14="http://schemas.microsoft.com/office/powerpoint/2010/main" val="2440980659"/>
       </p:ext>
     </p:extLst>
   </p:cSld>
@@ -11838,6 +12014,228 @@
 </file>
 
 <file path=ppt/slides/slide21.xml><?xml version="1.0" encoding="utf-8"?>
+<p:sld xmlns:a="http://schemas.openxmlformats.org/drawingml/2006/main" xmlns:r="http://schemas.openxmlformats.org/officeDocument/2006/relationships" xmlns:p="http://schemas.openxmlformats.org/presentationml/2006/main">
+  <p:cSld>
+    <p:spTree>
+      <p:nvGrpSpPr>
+        <p:cNvPr id="1" name="">
+          <a:extLst>
+            <a:ext uri="{FF2B5EF4-FFF2-40B4-BE49-F238E27FC236}">
+              <a16:creationId xmlns:a16="http://schemas.microsoft.com/office/drawing/2014/main" id="{AE9A8575-4999-E1B0-F91E-4194DAC0965D}"/>
+            </a:ext>
+          </a:extLst>
+        </p:cNvPr>
+        <p:cNvGrpSpPr/>
+        <p:nvPr/>
+      </p:nvGrpSpPr>
+      <p:grpSpPr>
+        <a:xfrm>
+          <a:off x="0" y="0"/>
+          <a:ext cx="0" cy="0"/>
+          <a:chOff x="0" y="0"/>
+          <a:chExt cx="0" cy="0"/>
+        </a:xfrm>
+      </p:grpSpPr>
+      <p:sp>
+        <p:nvSpPr>
+          <p:cNvPr id="6" name="TextBox 5">
+            <a:extLst>
+              <a:ext uri="{FF2B5EF4-FFF2-40B4-BE49-F238E27FC236}">
+                <a16:creationId xmlns:a16="http://schemas.microsoft.com/office/drawing/2014/main" id="{67DAFC14-9906-73BE-E356-877E3F30D4AA}"/>
+              </a:ext>
+            </a:extLst>
+          </p:cNvPr>
+          <p:cNvSpPr txBox="1"/>
+          <p:nvPr/>
+        </p:nvSpPr>
+        <p:spPr>
+          <a:xfrm>
+            <a:off x="404145" y="2136944"/>
+            <a:ext cx="4446987" cy="738664"/>
+          </a:xfrm>
+          <a:prstGeom prst="rect">
+            <a:avLst/>
+          </a:prstGeom>
+          <a:noFill/>
+        </p:spPr>
+        <p:txBody>
+          <a:bodyPr wrap="square" rtlCol="0">
+            <a:spAutoFit/>
+          </a:bodyPr>
+          <a:lstStyle/>
+          <a:p>
+            <a:pPr marL="285750" indent="-285750">
+              <a:buFont typeface="Arial" panose="020B0604020202020204" pitchFamily="34" charset="0"/>
+              <a:buChar char="•"/>
+            </a:pPr>
+            <a:r>
+              <a:rPr lang="en-US" sz="1400" b="1" dirty="0">
+                <a:latin typeface="Open Sans" pitchFamily="2" charset="0"/>
+                <a:ea typeface="Open Sans" pitchFamily="2" charset="0"/>
+                <a:cs typeface="Open Sans" pitchFamily="2" charset="0"/>
+              </a:rPr>
+              <a:t>Supervisors</a:t>
+            </a:r>
+            <a:r>
+              <a:rPr lang="en-US" sz="1400" dirty="0">
+                <a:latin typeface="Open Sans" pitchFamily="2" charset="0"/>
+                <a:ea typeface="Open Sans" pitchFamily="2" charset="0"/>
+                <a:cs typeface="Open Sans" pitchFamily="2" charset="0"/>
+              </a:rPr>
+              <a:t> have the highest resignation rate and a low task completion rate, whereas </a:t>
+            </a:r>
+            <a:r>
+              <a:rPr lang="en-US" sz="1400" b="1" dirty="0">
+                <a:latin typeface="Open Sans" pitchFamily="2" charset="0"/>
+                <a:ea typeface="Open Sans" pitchFamily="2" charset="0"/>
+                <a:cs typeface="Open Sans" pitchFamily="2" charset="0"/>
+              </a:rPr>
+              <a:t>Coordinators</a:t>
+            </a:r>
+            <a:r>
+              <a:rPr lang="en-US" sz="1400" dirty="0">
+                <a:latin typeface="Open Sans" pitchFamily="2" charset="0"/>
+                <a:ea typeface="Open Sans" pitchFamily="2" charset="0"/>
+                <a:cs typeface="Open Sans" pitchFamily="2" charset="0"/>
+              </a:rPr>
+              <a:t> have the lowest resignation rate.</a:t>
+            </a:r>
+          </a:p>
+        </p:txBody>
+      </p:sp>
+      <p:sp>
+        <p:nvSpPr>
+          <p:cNvPr id="7" name="TextBox 6">
+            <a:extLst>
+              <a:ext uri="{FF2B5EF4-FFF2-40B4-BE49-F238E27FC236}">
+                <a16:creationId xmlns:a16="http://schemas.microsoft.com/office/drawing/2014/main" id="{0AEABB68-67E8-EC75-E0EF-D2C0FCD83876}"/>
+              </a:ext>
+            </a:extLst>
+          </p:cNvPr>
+          <p:cNvSpPr txBox="1"/>
+          <p:nvPr/>
+        </p:nvSpPr>
+        <p:spPr>
+          <a:xfrm>
+            <a:off x="591127" y="341745"/>
+            <a:ext cx="6751782" cy="646331"/>
+          </a:xfrm>
+          <a:prstGeom prst="rect">
+            <a:avLst/>
+          </a:prstGeom>
+          <a:noFill/>
+        </p:spPr>
+        <p:txBody>
+          <a:bodyPr wrap="square" rtlCol="0">
+            <a:spAutoFit/>
+          </a:bodyPr>
+          <a:lstStyle/>
+          <a:p>
+            <a:r>
+              <a:rPr lang="en-US" sz="3600" b="1" dirty="0">
+                <a:latin typeface="Open Sans" pitchFamily="2" charset="0"/>
+                <a:ea typeface="Open Sans" pitchFamily="2" charset="0"/>
+                <a:cs typeface="Open Sans" pitchFamily="2" charset="0"/>
+              </a:rPr>
+              <a:t>Communicating Results</a:t>
+            </a:r>
+            <a:endParaRPr lang="en-US" sz="3600" b="1" dirty="0"/>
+          </a:p>
+        </p:txBody>
+      </p:sp>
+      <p:sp>
+        <p:nvSpPr>
+          <p:cNvPr id="4" name="Rectangle: Rounded Corners 3">
+            <a:extLst>
+              <a:ext uri="{FF2B5EF4-FFF2-40B4-BE49-F238E27FC236}">
+                <a16:creationId xmlns:a16="http://schemas.microsoft.com/office/drawing/2014/main" id="{1A943B87-A6C5-8113-A6DA-9174A29AC919}"/>
+              </a:ext>
+            </a:extLst>
+          </p:cNvPr>
+          <p:cNvSpPr/>
+          <p:nvPr/>
+        </p:nvSpPr>
+        <p:spPr>
+          <a:xfrm>
+            <a:off x="5048574" y="2136943"/>
+            <a:ext cx="6883893" cy="3041639"/>
+          </a:xfrm>
+          <a:prstGeom prst="roundRect">
+            <a:avLst>
+              <a:gd name="adj" fmla="val 1291"/>
+            </a:avLst>
+          </a:prstGeom>
+          <a:ln>
+            <a:noFill/>
+          </a:ln>
+        </p:spPr>
+        <p:style>
+          <a:lnRef idx="2">
+            <a:schemeClr val="accent2"/>
+          </a:lnRef>
+          <a:fillRef idx="1">
+            <a:schemeClr val="lt1"/>
+          </a:fillRef>
+          <a:effectRef idx="0">
+            <a:schemeClr val="accent2"/>
+          </a:effectRef>
+          <a:fontRef idx="minor">
+            <a:schemeClr val="dk1"/>
+          </a:fontRef>
+        </p:style>
+        <p:txBody>
+          <a:bodyPr rtlCol="0" anchor="ctr"/>
+          <a:lstStyle/>
+          <a:p>
+            <a:pPr algn="ctr"/>
+            <a:endParaRPr lang="en-US"/>
+          </a:p>
+        </p:txBody>
+      </p:sp>
+      <p:pic>
+        <p:nvPicPr>
+          <p:cNvPr id="5" name="Picture 4">
+            <a:extLst>
+              <a:ext uri="{FF2B5EF4-FFF2-40B4-BE49-F238E27FC236}">
+                <a16:creationId xmlns:a16="http://schemas.microsoft.com/office/drawing/2014/main" id="{D8139E11-69D1-4A54-8DB2-C546151B4A47}"/>
+              </a:ext>
+            </a:extLst>
+          </p:cNvPr>
+          <p:cNvPicPr>
+            <a:picLocks noChangeAspect="1"/>
+          </p:cNvPicPr>
+          <p:nvPr/>
+        </p:nvPicPr>
+        <p:blipFill>
+          <a:blip r:embed="rId2"/>
+          <a:stretch>
+            <a:fillRect/>
+          </a:stretch>
+        </p:blipFill>
+        <p:spPr>
+          <a:xfrm>
+            <a:off x="5147117" y="2280882"/>
+            <a:ext cx="6550204" cy="2753759"/>
+          </a:xfrm>
+          <a:prstGeom prst="rect">
+            <a:avLst/>
+          </a:prstGeom>
+        </p:spPr>
+      </p:pic>
+    </p:spTree>
+    <p:extLst>
+      <p:ext uri="{BB962C8B-B14F-4D97-AF65-F5344CB8AC3E}">
+        <p14:creationId xmlns:p14="http://schemas.microsoft.com/office/powerpoint/2010/main" val="3193205242"/>
+      </p:ext>
+    </p:extLst>
+  </p:cSld>
+  <p:clrMapOvr>
+    <a:masterClrMapping/>
+  </p:clrMapOvr>
+</p:sld>
+</file>
+
+<file path=ppt/slides/slide22.xml><?xml version="1.0" encoding="utf-8"?>
 <p:sld xmlns:a="http://schemas.openxmlformats.org/drawingml/2006/main" xmlns:r="http://schemas.openxmlformats.org/officeDocument/2006/relationships" xmlns:p="http://schemas.openxmlformats.org/presentationml/2006/main">
   <p:cSld>
     <p:spTree>
@@ -12081,7 +12479,7 @@
 </p:sld>
 </file>
 
-<file path=ppt/slides/slide22.xml><?xml version="1.0" encoding="utf-8"?>
+<file path=ppt/slides/slide23.xml><?xml version="1.0" encoding="utf-8"?>
 <p:sld xmlns:a="http://schemas.openxmlformats.org/drawingml/2006/main" xmlns:r="http://schemas.openxmlformats.org/officeDocument/2006/relationships" xmlns:p="http://schemas.openxmlformats.org/presentationml/2006/main">
   <p:cSld>
     <p:spTree>
@@ -12341,7 +12739,7 @@
 </p:sld>
 </file>
 
-<file path=ppt/slides/slide23.xml><?xml version="1.0" encoding="utf-8"?>
+<file path=ppt/slides/slide24.xml><?xml version="1.0" encoding="utf-8"?>
 <p:sld xmlns:a="http://schemas.openxmlformats.org/drawingml/2006/main" xmlns:r="http://schemas.openxmlformats.org/officeDocument/2006/relationships" xmlns:p="http://schemas.openxmlformats.org/presentationml/2006/main">
   <p:cSld>
     <p:spTree>
@@ -12732,13 +13130,13 @@
   <p:clrMapOvr>
     <a:masterClrMapping/>
   </p:clrMapOvr>
-  <mc:AlternateContent xmlns:mc="http://schemas.openxmlformats.org/markup-compatibility/2006">
-    <mc:Choice xmlns:p159="http://schemas.microsoft.com/office/powerpoint/2015/09/main" Requires="p159">
+  <mc:AlternateContent xmlns:mc="http://schemas.openxmlformats.org/markup-compatibility/2006" xmlns:p159="http://schemas.microsoft.com/office/powerpoint/2015/09/main">
+    <mc:Choice Requires="p159">
       <p:transition xmlns:p14="http://schemas.microsoft.com/office/powerpoint/2010/main" spd="slow" p14:dur="2000">
         <p159:morph option="byObject"/>
       </p:transition>
     </mc:Choice>
-    <mc:Fallback>
+    <mc:Fallback xmlns="">
       <p:transition spd="slow">
         <p:fade/>
       </p:transition>
@@ -12747,7 +13145,7 @@
 </p:sld>
 </file>
 
-<file path=ppt/slides/slide24.xml><?xml version="1.0" encoding="utf-8"?>
+<file path=ppt/slides/slide25.xml><?xml version="1.0" encoding="utf-8"?>
 <p:sld xmlns:a="http://schemas.openxmlformats.org/drawingml/2006/main" xmlns:r="http://schemas.openxmlformats.org/officeDocument/2006/relationships" xmlns:p="http://schemas.openxmlformats.org/presentationml/2006/main">
   <p:cSld>
     <p:spTree>
@@ -12945,7 +13343,7 @@
 </p:sld>
 </file>
 
-<file path=ppt/slides/slide25.xml><?xml version="1.0" encoding="utf-8"?>
+<file path=ppt/slides/slide26.xml><?xml version="1.0" encoding="utf-8"?>
 <p:sld xmlns:a="http://schemas.openxmlformats.org/drawingml/2006/main" xmlns:r="http://schemas.openxmlformats.org/officeDocument/2006/relationships" xmlns:p="http://schemas.openxmlformats.org/presentationml/2006/main">
   <p:cSld>
     <p:bg>
@@ -13037,7 +13435,7 @@
 </p:sld>
 </file>
 
-<file path=ppt/slides/slide26.xml><?xml version="1.0" encoding="utf-8"?>
+<file path=ppt/slides/slide27.xml><?xml version="1.0" encoding="utf-8"?>
 <p:sld xmlns:a="http://schemas.openxmlformats.org/drawingml/2006/main" xmlns:r="http://schemas.openxmlformats.org/officeDocument/2006/relationships" xmlns:p="http://schemas.openxmlformats.org/presentationml/2006/main">
   <p:cSld>
     <p:spTree>
@@ -13241,7 +13639,7 @@
 </p:sld>
 </file>
 
-<file path=ppt/slides/slide27.xml><?xml version="1.0" encoding="utf-8"?>
+<file path=ppt/slides/slide28.xml><?xml version="1.0" encoding="utf-8"?>
 <p:sld xmlns:a="http://schemas.openxmlformats.org/drawingml/2006/main" xmlns:r="http://schemas.openxmlformats.org/officeDocument/2006/relationships" xmlns:p="http://schemas.openxmlformats.org/presentationml/2006/main">
   <p:cSld>
     <p:spTree>
@@ -13521,7 +13919,7 @@
 </p:sld>
 </file>
 
-<file path=ppt/slides/slide28.xml><?xml version="1.0" encoding="utf-8"?>
+<file path=ppt/slides/slide29.xml><?xml version="1.0" encoding="utf-8"?>
 <p:sld xmlns:a="http://schemas.openxmlformats.org/drawingml/2006/main" xmlns:r="http://schemas.openxmlformats.org/officeDocument/2006/relationships" xmlns:p="http://schemas.openxmlformats.org/presentationml/2006/main">
   <p:cSld>
     <p:spTree>
@@ -14860,7 +15258,7 @@
           </a:bodyPr>
           <a:lstStyle/>
           <a:p>
-            <a:pPr algn="r">
+            <a:pPr>
               <a:spcBef>
                 <a:spcPct val="0"/>
               </a:spcBef>
@@ -14869,7 +15267,7 @@
               </a:spcAft>
             </a:pPr>
             <a:r>
-              <a:rPr lang="en-US" sz="3600" b="1" cap="all">
+              <a:rPr lang="en-US" sz="3600" b="1" cap="all" dirty="0">
                 <a:ln w="3175" cmpd="sng">
                   <a:noFill/>
                 </a:ln>
@@ -15646,7 +16044,7 @@
           </a:bodyPr>
           <a:lstStyle/>
           <a:p>
-            <a:pPr algn="r">
+            <a:pPr>
               <a:spcBef>
                 <a:spcPct val="0"/>
               </a:spcBef>
@@ -15655,7 +16053,7 @@
               </a:spcAft>
             </a:pPr>
             <a:r>
-              <a:rPr lang="en-US" sz="3600" b="1" cap="all">
+              <a:rPr lang="en-US" sz="3600" b="1" cap="all" dirty="0">
                 <a:ln w="3175" cmpd="sng">
                   <a:noFill/>
                 </a:ln>
@@ -16393,7 +16791,7 @@
           </a:bodyPr>
           <a:lstStyle/>
           <a:p>
-            <a:pPr algn="r">
+            <a:pPr>
               <a:spcBef>
                 <a:spcPct val="0"/>
               </a:spcBef>
@@ -16402,7 +16800,7 @@
               </a:spcAft>
             </a:pPr>
             <a:r>
-              <a:rPr lang="en-US" sz="3600" b="1" cap="all">
+              <a:rPr lang="en-US" sz="3600" b="1" cap="all" dirty="0">
                 <a:ln w="3175" cmpd="sng">
                   <a:noFill/>
                 </a:ln>
@@ -17203,7 +17601,7 @@
           </a:bodyPr>
           <a:lstStyle/>
           <a:p>
-            <a:pPr algn="r">
+            <a:pPr>
               <a:spcBef>
                 <a:spcPct val="0"/>
               </a:spcBef>
@@ -17212,7 +17610,7 @@
               </a:spcAft>
             </a:pPr>
             <a:r>
-              <a:rPr lang="en-US" sz="3600" b="1" cap="all">
+              <a:rPr lang="en-US" sz="3600" b="1" cap="all" dirty="0">
                 <a:ln w="3175" cmpd="sng">
                   <a:noFill/>
                 </a:ln>
@@ -18029,7 +18427,7 @@
           </a:bodyPr>
           <a:lstStyle/>
           <a:p>
-            <a:pPr algn="r">
+            <a:pPr>
               <a:spcBef>
                 <a:spcPct val="0"/>
               </a:spcBef>
@@ -18108,7 +18506,7 @@
       </p:grpSpPr>
       <p:cxnSp>
         <p:nvCxnSpPr>
-          <p:cNvPr id="9" name="Straight Connector 8">
+          <p:cNvPr id="49" name="Straight Connector 48">
             <a:extLst>
               <a:ext uri="{FF2B5EF4-FFF2-40B4-BE49-F238E27FC236}">
                 <a16:creationId xmlns:a16="http://schemas.microsoft.com/office/drawing/2014/main" id="{8FD48FB1-66D8-4676-B0AA-C139A1DB78D1}"/>
@@ -18160,7 +18558,7 @@
       </p:cxnSp>
       <p:cxnSp>
         <p:nvCxnSpPr>
-          <p:cNvPr id="11" name="Straight Connector 10">
+          <p:cNvPr id="50" name="Straight Connector 49">
             <a:extLst>
               <a:ext uri="{FF2B5EF4-FFF2-40B4-BE49-F238E27FC236}">
                 <a16:creationId xmlns:a16="http://schemas.microsoft.com/office/drawing/2014/main" id="{F033F5AE-6728-4F19-8DED-658E674B31B9}"/>
@@ -18212,7 +18610,7 @@
       </p:cxnSp>
       <p:cxnSp>
         <p:nvCxnSpPr>
-          <p:cNvPr id="13" name="Straight Connector 12">
+          <p:cNvPr id="51" name="Straight Connector 50">
             <a:extLst>
               <a:ext uri="{FF2B5EF4-FFF2-40B4-BE49-F238E27FC236}">
                 <a16:creationId xmlns:a16="http://schemas.microsoft.com/office/drawing/2014/main" id="{82C7D74A-18BA-4709-A808-44E8815C4430}"/>
@@ -18264,7 +18662,7 @@
       </p:cxnSp>
       <p:cxnSp>
         <p:nvCxnSpPr>
-          <p:cNvPr id="15" name="Straight Connector 14">
+          <p:cNvPr id="52" name="Straight Connector 51">
             <a:extLst>
               <a:ext uri="{FF2B5EF4-FFF2-40B4-BE49-F238E27FC236}">
                 <a16:creationId xmlns:a16="http://schemas.microsoft.com/office/drawing/2014/main" id="{B5164A3F-1561-4039-8185-AB0EEB713EA7}"/>
@@ -18316,7 +18714,7 @@
       </p:cxnSp>
       <p:cxnSp>
         <p:nvCxnSpPr>
-          <p:cNvPr id="17" name="Straight Connector 16">
+          <p:cNvPr id="53" name="Straight Connector 52">
             <a:extLst>
               <a:ext uri="{FF2B5EF4-FFF2-40B4-BE49-F238E27FC236}">
                 <a16:creationId xmlns:a16="http://schemas.microsoft.com/office/drawing/2014/main" id="{2A35DB53-42BE-460E-9CA1-1294C98463CB}"/>
@@ -18368,7 +18766,7 @@
       </p:cxnSp>
       <p:sp>
         <p:nvSpPr>
-          <p:cNvPr id="19" name="Rectangle 18">
+          <p:cNvPr id="54" name="Rectangle 53">
             <a:extLst>
               <a:ext uri="{FF2B5EF4-FFF2-40B4-BE49-F238E27FC236}">
                 <a16:creationId xmlns:a16="http://schemas.microsoft.com/office/drawing/2014/main" id="{7A675F33-98AF-4B83-A3BB-0780A23145E6}"/>
@@ -18448,10 +18846,10 @@
       </p:sp>
       <p:pic>
         <p:nvPicPr>
-          <p:cNvPr id="4" name="Picture 3" descr="A screenshot of a computer&#10;&#10;AI-generated content may be incorrect.">
+          <p:cNvPr id="5" name="Picture 4">
             <a:extLst>
               <a:ext uri="{FF2B5EF4-FFF2-40B4-BE49-F238E27FC236}">
-                <a16:creationId xmlns:a16="http://schemas.microsoft.com/office/drawing/2014/main" id="{F4B4C777-6366-E775-A69B-E42AB20827E9}"/>
+                <a16:creationId xmlns:a16="http://schemas.microsoft.com/office/drawing/2014/main" id="{7E337459-8EEC-8636-1A3A-2441083F93CA}"/>
               </a:ext>
             </a:extLst>
           </p:cNvPr>
@@ -18463,11 +18861,6 @@
         <p:blipFill>
           <a:blip r:embed="rId2">
             <a:alphaModFix amt="25000"/>
-            <a:extLst>
-              <a:ext uri="{28A0092B-C50C-407E-A947-70E740481C1C}">
-                <a14:useLocalDpi xmlns:a14="http://schemas.microsoft.com/office/drawing/2010/main" val="0"/>
-              </a:ext>
-            </a:extLst>
           </a:blip>
           <a:srcRect/>
           <a:stretch>
@@ -18498,8 +18891,8 @@
         </p:nvSpPr>
         <p:spPr>
           <a:xfrm>
-            <a:off x="149140" y="685123"/>
-            <a:ext cx="8821927" cy="2971801"/>
+            <a:off x="684212" y="685799"/>
+            <a:ext cx="8001000" cy="2971801"/>
           </a:xfrm>
           <a:prstGeom prst="rect">
             <a:avLst/>
@@ -18520,13 +18913,13 @@
               </a:spcAft>
             </a:pPr>
             <a:r>
-              <a:rPr lang="en-US" sz="4800" b="1" cap="all" dirty="0">
+              <a:rPr lang="en-US" sz="4800" b="1" cap="all">
                 <a:ln w="3175" cmpd="sng">
                   <a:noFill/>
                 </a:ln>
-                <a:latin typeface="Open Sans" pitchFamily="2" charset="0"/>
-                <a:ea typeface="Open Sans" pitchFamily="2" charset="0"/>
-                <a:cs typeface="Open Sans" pitchFamily="2" charset="0"/>
+                <a:latin typeface="+mj-lt"/>
+                <a:ea typeface="+mj-ea"/>
+                <a:cs typeface="+mj-cs"/>
               </a:rPr>
               <a:t>Communicating Results</a:t>
             </a:r>
@@ -18535,7 +18928,7 @@
       </p:sp>
       <p:grpSp>
         <p:nvGrpSpPr>
-          <p:cNvPr id="21" name="Group 20">
+          <p:cNvPr id="43" name="Group 42">
             <a:extLst>
               <a:ext uri="{FF2B5EF4-FFF2-40B4-BE49-F238E27FC236}">
                 <a16:creationId xmlns:a16="http://schemas.microsoft.com/office/drawing/2014/main" id="{EA75029C-64B9-41D0-9540-75846D4B04A5}"/>
@@ -18566,7 +18959,7 @@
         </p:grpSpPr>
         <p:cxnSp>
           <p:nvCxnSpPr>
-            <p:cNvPr id="22" name="Straight Connector 21">
+            <p:cNvPr id="44" name="Straight Connector 43">
               <a:extLst>
                 <a:ext uri="{FF2B5EF4-FFF2-40B4-BE49-F238E27FC236}">
                   <a16:creationId xmlns:a16="http://schemas.microsoft.com/office/drawing/2014/main" id="{4AF6B07A-A0CD-4593-B501-E1D50968C78F}"/>
@@ -18616,7 +19009,7 @@
         </p:cxnSp>
         <p:cxnSp>
           <p:nvCxnSpPr>
-            <p:cNvPr id="23" name="Straight Connector 22">
+            <p:cNvPr id="45" name="Straight Connector 44">
               <a:extLst>
                 <a:ext uri="{FF2B5EF4-FFF2-40B4-BE49-F238E27FC236}">
                   <a16:creationId xmlns:a16="http://schemas.microsoft.com/office/drawing/2014/main" id="{E1C2E537-D046-43E9-B78A-8D770E4C0FAA}"/>
@@ -18666,7 +19059,7 @@
         </p:cxnSp>
         <p:cxnSp>
           <p:nvCxnSpPr>
-            <p:cNvPr id="24" name="Straight Connector 23">
+            <p:cNvPr id="46" name="Straight Connector 45">
               <a:extLst>
                 <a:ext uri="{FF2B5EF4-FFF2-40B4-BE49-F238E27FC236}">
                   <a16:creationId xmlns:a16="http://schemas.microsoft.com/office/drawing/2014/main" id="{CF1ED42C-32AB-4AA5-B9D5-2ADF552B0379}"/>
@@ -18716,7 +19109,7 @@
         </p:cxnSp>
         <p:cxnSp>
           <p:nvCxnSpPr>
-            <p:cNvPr id="25" name="Straight Connector 24">
+            <p:cNvPr id="47" name="Straight Connector 46">
               <a:extLst>
                 <a:ext uri="{FF2B5EF4-FFF2-40B4-BE49-F238E27FC236}">
                   <a16:creationId xmlns:a16="http://schemas.microsoft.com/office/drawing/2014/main" id="{62B69715-83DD-4F53-8564-D95D5D238DA8}"/>
@@ -18766,7 +19159,7 @@
         </p:cxnSp>
         <p:cxnSp>
           <p:nvCxnSpPr>
-            <p:cNvPr id="26" name="Straight Connector 25">
+            <p:cNvPr id="48" name="Straight Connector 47">
               <a:extLst>
                 <a:ext uri="{FF2B5EF4-FFF2-40B4-BE49-F238E27FC236}">
                   <a16:creationId xmlns:a16="http://schemas.microsoft.com/office/drawing/2014/main" id="{25BC2EBE-B4C1-42F9-9914-0F430C0600A7}"/>

</xml_diff>